<commit_message>
added more to the presentation for my section and abit of general goals
</commit_message>
<xml_diff>
--- a/Presentation/4th Year Presentation.pptx
+++ b/Presentation/4th Year Presentation.pptx
@@ -10,11 +10,12 @@
     <p:sldId id="262" r:id="rId4"/>
     <p:sldId id="263" r:id="rId5"/>
     <p:sldId id="264" r:id="rId6"/>
-    <p:sldId id="258" r:id="rId7"/>
-    <p:sldId id="259" r:id="rId8"/>
-    <p:sldId id="260" r:id="rId9"/>
+    <p:sldId id="266" r:id="rId7"/>
+    <p:sldId id="267" r:id="rId8"/>
+    <p:sldId id="258" r:id="rId9"/>
     <p:sldId id="261" r:id="rId10"/>
-    <p:sldId id="265" r:id="rId11"/>
+    <p:sldId id="259" r:id="rId11"/>
+    <p:sldId id="265" r:id="rId12"/>
   </p:sldIdLst>
   <p:sldSz cx="12192000" cy="6858000"/>
   <p:notesSz cx="6858000" cy="9144000"/>
@@ -123,10 +124,11 @@
             <p14:sldId id="262"/>
             <p14:sldId id="263"/>
             <p14:sldId id="264"/>
+            <p14:sldId id="266"/>
+            <p14:sldId id="267"/>
             <p14:sldId id="258"/>
+            <p14:sldId id="261"/>
             <p14:sldId id="259"/>
-            <p14:sldId id="260"/>
-            <p14:sldId id="261"/>
             <p14:sldId id="265"/>
           </p14:sldIdLst>
         </p14:section>
@@ -579,7 +581,7 @@
           <a:p>
             <a:fld id="{352BC94D-B67F-4900-991F-6B3AA9ACFC04}" type="datetimeFigureOut">
               <a:rPr lang="en-IE" smtClean="0"/>
-              <a:t>24/11/2020</a:t>
+              <a:t>02/12/2020</a:t>
             </a:fld>
             <a:endParaRPr lang="en-IE"/>
           </a:p>
@@ -779,7 +781,7 @@
           <a:p>
             <a:fld id="{352BC94D-B67F-4900-991F-6B3AA9ACFC04}" type="datetimeFigureOut">
               <a:rPr lang="en-IE" smtClean="0"/>
-              <a:t>24/11/2020</a:t>
+              <a:t>02/12/2020</a:t>
             </a:fld>
             <a:endParaRPr lang="en-IE"/>
           </a:p>
@@ -989,7 +991,7 @@
           <a:p>
             <a:fld id="{352BC94D-B67F-4900-991F-6B3AA9ACFC04}" type="datetimeFigureOut">
               <a:rPr lang="en-IE" smtClean="0"/>
-              <a:t>24/11/2020</a:t>
+              <a:t>02/12/2020</a:t>
             </a:fld>
             <a:endParaRPr lang="en-IE"/>
           </a:p>
@@ -1189,7 +1191,7 @@
           <a:p>
             <a:fld id="{352BC94D-B67F-4900-991F-6B3AA9ACFC04}" type="datetimeFigureOut">
               <a:rPr lang="en-IE" smtClean="0"/>
-              <a:t>24/11/2020</a:t>
+              <a:t>02/12/2020</a:t>
             </a:fld>
             <a:endParaRPr lang="en-IE"/>
           </a:p>
@@ -1465,7 +1467,7 @@
           <a:p>
             <a:fld id="{352BC94D-B67F-4900-991F-6B3AA9ACFC04}" type="datetimeFigureOut">
               <a:rPr lang="en-IE" smtClean="0"/>
-              <a:t>24/11/2020</a:t>
+              <a:t>02/12/2020</a:t>
             </a:fld>
             <a:endParaRPr lang="en-IE"/>
           </a:p>
@@ -1733,7 +1735,7 @@
           <a:p>
             <a:fld id="{352BC94D-B67F-4900-991F-6B3AA9ACFC04}" type="datetimeFigureOut">
               <a:rPr lang="en-IE" smtClean="0"/>
-              <a:t>24/11/2020</a:t>
+              <a:t>02/12/2020</a:t>
             </a:fld>
             <a:endParaRPr lang="en-IE"/>
           </a:p>
@@ -2148,7 +2150,7 @@
           <a:p>
             <a:fld id="{352BC94D-B67F-4900-991F-6B3AA9ACFC04}" type="datetimeFigureOut">
               <a:rPr lang="en-IE" smtClean="0"/>
-              <a:t>24/11/2020</a:t>
+              <a:t>02/12/2020</a:t>
             </a:fld>
             <a:endParaRPr lang="en-IE"/>
           </a:p>
@@ -2290,7 +2292,7 @@
           <a:p>
             <a:fld id="{352BC94D-B67F-4900-991F-6B3AA9ACFC04}" type="datetimeFigureOut">
               <a:rPr lang="en-IE" smtClean="0"/>
-              <a:t>24/11/2020</a:t>
+              <a:t>02/12/2020</a:t>
             </a:fld>
             <a:endParaRPr lang="en-IE"/>
           </a:p>
@@ -2403,7 +2405,7 @@
           <a:p>
             <a:fld id="{352BC94D-B67F-4900-991F-6B3AA9ACFC04}" type="datetimeFigureOut">
               <a:rPr lang="en-IE" smtClean="0"/>
-              <a:t>24/11/2020</a:t>
+              <a:t>02/12/2020</a:t>
             </a:fld>
             <a:endParaRPr lang="en-IE"/>
           </a:p>
@@ -2716,7 +2718,7 @@
           <a:p>
             <a:fld id="{352BC94D-B67F-4900-991F-6B3AA9ACFC04}" type="datetimeFigureOut">
               <a:rPr lang="en-IE" smtClean="0"/>
-              <a:t>24/11/2020</a:t>
+              <a:t>02/12/2020</a:t>
             </a:fld>
             <a:endParaRPr lang="en-IE"/>
           </a:p>
@@ -3005,7 +3007,7 @@
           <a:p>
             <a:fld id="{352BC94D-B67F-4900-991F-6B3AA9ACFC04}" type="datetimeFigureOut">
               <a:rPr lang="en-IE" smtClean="0"/>
-              <a:t>24/11/2020</a:t>
+              <a:t>02/12/2020</a:t>
             </a:fld>
             <a:endParaRPr lang="en-IE"/>
           </a:p>
@@ -3248,7 +3250,7 @@
           <a:p>
             <a:fld id="{352BC94D-B67F-4900-991F-6B3AA9ACFC04}" type="datetimeFigureOut">
               <a:rPr lang="en-IE" smtClean="0"/>
-              <a:t>24/11/2020</a:t>
+              <a:t>02/12/2020</a:t>
             </a:fld>
             <a:endParaRPr lang="en-IE"/>
           </a:p>
@@ -3786,6 +3788,973 @@
       </p:grpSpPr>
       <p:sp>
         <p:nvSpPr>
+          <p:cNvPr id="13" name="Rectangle 12">
+            <a:extLst>
+              <a:ext uri="{FF2B5EF4-FFF2-40B4-BE49-F238E27FC236}">
+                <a16:creationId xmlns:a16="http://schemas.microsoft.com/office/drawing/2014/main" id="{8D415432-49E0-466F-A1A6-B45B23B79E2C}"/>
+              </a:ext>
+            </a:extLst>
+          </p:cNvPr>
+          <p:cNvSpPr/>
+          <p:nvPr/>
+        </p:nvSpPr>
+        <p:spPr>
+          <a:xfrm>
+            <a:off x="37454" y="1292507"/>
+            <a:ext cx="11913514" cy="2217368"/>
+          </a:xfrm>
+          <a:prstGeom prst="rect">
+            <a:avLst/>
+          </a:prstGeom>
+          <a:solidFill>
+            <a:schemeClr val="accent3"/>
+          </a:solidFill>
+          <a:ln>
+            <a:noFill/>
+          </a:ln>
+        </p:spPr>
+        <p:style>
+          <a:lnRef idx="0">
+            <a:scrgbClr r="0" g="0" b="0"/>
+          </a:lnRef>
+          <a:fillRef idx="0">
+            <a:scrgbClr r="0" g="0" b="0"/>
+          </a:fillRef>
+          <a:effectRef idx="0">
+            <a:scrgbClr r="0" g="0" b="0"/>
+          </a:effectRef>
+          <a:fontRef idx="minor">
+            <a:schemeClr val="lt1"/>
+          </a:fontRef>
+        </p:style>
+        <p:txBody>
+          <a:bodyPr rtlCol="0" anchor="ctr"/>
+          <a:lstStyle/>
+          <a:p>
+            <a:pPr algn="ctr"/>
+            <a:endParaRPr lang="en-GB"/>
+          </a:p>
+        </p:txBody>
+      </p:sp>
+      <p:sp>
+        <p:nvSpPr>
+          <p:cNvPr id="2" name="Title 1">
+            <a:extLst>
+              <a:ext uri="{FF2B5EF4-FFF2-40B4-BE49-F238E27FC236}">
+                <a16:creationId xmlns:a16="http://schemas.microsoft.com/office/drawing/2014/main" id="{B70B6794-6443-40C1-BF14-DF19F2A8526E}"/>
+              </a:ext>
+            </a:extLst>
+          </p:cNvPr>
+          <p:cNvSpPr>
+            <a:spLocks noGrp="1"/>
+          </p:cNvSpPr>
+          <p:nvPr>
+            <p:ph type="title"/>
+          </p:nvPr>
+        </p:nvSpPr>
+        <p:spPr>
+          <a:xfrm>
+            <a:off x="0" y="0"/>
+            <a:ext cx="3547108" cy="958163"/>
+          </a:xfrm>
+        </p:spPr>
+        <p:txBody>
+          <a:bodyPr/>
+          <a:lstStyle/>
+          <a:p>
+            <a:r>
+              <a:rPr lang="en-IE" dirty="0"/>
+              <a:t>Website Pages</a:t>
+            </a:r>
+            <a:endParaRPr lang="en-IE" sz="1600" u="sng" dirty="0">
+              <a:solidFill>
+                <a:srgbClr val="FF0000"/>
+              </a:solidFill>
+            </a:endParaRPr>
+          </a:p>
+        </p:txBody>
+      </p:sp>
+      <p:pic>
+        <p:nvPicPr>
+          <p:cNvPr id="4" name="Picture 3">
+            <a:extLst>
+              <a:ext uri="{FF2B5EF4-FFF2-40B4-BE49-F238E27FC236}">
+                <a16:creationId xmlns:a16="http://schemas.microsoft.com/office/drawing/2014/main" id="{18FF8AF0-A639-4250-9BEC-BB98FC4B890D}"/>
+              </a:ext>
+            </a:extLst>
+          </p:cNvPr>
+          <p:cNvPicPr>
+            <a:picLocks noChangeAspect="1"/>
+          </p:cNvPicPr>
+          <p:nvPr/>
+        </p:nvPicPr>
+        <p:blipFill>
+          <a:blip r:embed="rId2"/>
+          <a:stretch>
+            <a:fillRect/>
+          </a:stretch>
+        </p:blipFill>
+        <p:spPr>
+          <a:xfrm>
+            <a:off x="5487350" y="1688870"/>
+            <a:ext cx="2639878" cy="1607601"/>
+          </a:xfrm>
+          <a:prstGeom prst="rect">
+            <a:avLst/>
+          </a:prstGeom>
+        </p:spPr>
+      </p:pic>
+      <p:pic>
+        <p:nvPicPr>
+          <p:cNvPr id="5" name="Content Placeholder 4">
+            <a:extLst>
+              <a:ext uri="{FF2B5EF4-FFF2-40B4-BE49-F238E27FC236}">
+                <a16:creationId xmlns:a16="http://schemas.microsoft.com/office/drawing/2014/main" id="{40B284E9-9B91-41F7-852F-EB9FFCD946C0}"/>
+              </a:ext>
+            </a:extLst>
+          </p:cNvPr>
+          <p:cNvPicPr>
+            <a:picLocks noGrp="1" noChangeAspect="1"/>
+          </p:cNvPicPr>
+          <p:nvPr>
+            <p:ph idx="1"/>
+          </p:nvPr>
+        </p:nvPicPr>
+        <p:blipFill>
+          <a:blip r:embed="rId3"/>
+          <a:stretch>
+            <a:fillRect/>
+          </a:stretch>
+        </p:blipFill>
+        <p:spPr>
+          <a:xfrm>
+            <a:off x="9201621" y="1614499"/>
+            <a:ext cx="2399801" cy="1691032"/>
+          </a:xfrm>
+          <a:prstGeom prst="rect">
+            <a:avLst/>
+          </a:prstGeom>
+        </p:spPr>
+      </p:pic>
+      <p:sp>
+        <p:nvSpPr>
+          <p:cNvPr id="6" name="TextBox 5">
+            <a:extLst>
+              <a:ext uri="{FF2B5EF4-FFF2-40B4-BE49-F238E27FC236}">
+                <a16:creationId xmlns:a16="http://schemas.microsoft.com/office/drawing/2014/main" id="{D73F94B1-3ED6-42A0-A0B1-4EB88607CF5D}"/>
+              </a:ext>
+            </a:extLst>
+          </p:cNvPr>
+          <p:cNvSpPr txBox="1"/>
+          <p:nvPr/>
+        </p:nvSpPr>
+        <p:spPr>
+          <a:xfrm>
+            <a:off x="5871049" y="1246224"/>
+            <a:ext cx="2203770" cy="369332"/>
+          </a:xfrm>
+          <a:prstGeom prst="rect">
+            <a:avLst/>
+          </a:prstGeom>
+          <a:noFill/>
+        </p:spPr>
+        <p:txBody>
+          <a:bodyPr wrap="square" rtlCol="0">
+            <a:spAutoFit/>
+          </a:bodyPr>
+          <a:lstStyle/>
+          <a:p>
+            <a:r>
+              <a:rPr lang="en-GB" dirty="0"/>
+              <a:t>Calendar Page</a:t>
+            </a:r>
+          </a:p>
+        </p:txBody>
+      </p:sp>
+      <p:sp>
+        <p:nvSpPr>
+          <p:cNvPr id="7" name="TextBox 6">
+            <a:extLst>
+              <a:ext uri="{FF2B5EF4-FFF2-40B4-BE49-F238E27FC236}">
+                <a16:creationId xmlns:a16="http://schemas.microsoft.com/office/drawing/2014/main" id="{5D8FCDBB-782B-44AD-876A-ACD78649C362}"/>
+              </a:ext>
+            </a:extLst>
+          </p:cNvPr>
+          <p:cNvSpPr txBox="1"/>
+          <p:nvPr/>
+        </p:nvSpPr>
+        <p:spPr>
+          <a:xfrm>
+            <a:off x="9593949" y="1243881"/>
+            <a:ext cx="2455942" cy="369332"/>
+          </a:xfrm>
+          <a:prstGeom prst="rect">
+            <a:avLst/>
+          </a:prstGeom>
+          <a:noFill/>
+        </p:spPr>
+        <p:txBody>
+          <a:bodyPr wrap="square" rtlCol="0">
+            <a:spAutoFit/>
+          </a:bodyPr>
+          <a:lstStyle/>
+          <a:p>
+            <a:r>
+              <a:rPr lang="en-GB" dirty="0"/>
+              <a:t>Help /Contact Page</a:t>
+            </a:r>
+          </a:p>
+        </p:txBody>
+      </p:sp>
+      <p:pic>
+        <p:nvPicPr>
+          <p:cNvPr id="8" name="Picture 7">
+            <a:extLst>
+              <a:ext uri="{FF2B5EF4-FFF2-40B4-BE49-F238E27FC236}">
+                <a16:creationId xmlns:a16="http://schemas.microsoft.com/office/drawing/2014/main" id="{3675D92F-2215-4F04-8682-3F2A3AA2D4AF}"/>
+              </a:ext>
+            </a:extLst>
+          </p:cNvPr>
+          <p:cNvPicPr>
+            <a:picLocks noChangeAspect="1"/>
+          </p:cNvPicPr>
+          <p:nvPr/>
+        </p:nvPicPr>
+        <p:blipFill>
+          <a:blip r:embed="rId4"/>
+          <a:stretch>
+            <a:fillRect/>
+          </a:stretch>
+        </p:blipFill>
+        <p:spPr>
+          <a:xfrm>
+            <a:off x="2378341" y="1688870"/>
+            <a:ext cx="2696449" cy="1607601"/>
+          </a:xfrm>
+          <a:prstGeom prst="rect">
+            <a:avLst/>
+          </a:prstGeom>
+        </p:spPr>
+      </p:pic>
+      <p:sp>
+        <p:nvSpPr>
+          <p:cNvPr id="9" name="TextBox 8">
+            <a:extLst>
+              <a:ext uri="{FF2B5EF4-FFF2-40B4-BE49-F238E27FC236}">
+                <a16:creationId xmlns:a16="http://schemas.microsoft.com/office/drawing/2014/main" id="{5458793E-EABD-44DE-AF53-0820ECD3D6FE}"/>
+              </a:ext>
+            </a:extLst>
+          </p:cNvPr>
+          <p:cNvSpPr txBox="1"/>
+          <p:nvPr/>
+        </p:nvSpPr>
+        <p:spPr>
+          <a:xfrm>
+            <a:off x="307422" y="1241752"/>
+            <a:ext cx="1533305" cy="369332"/>
+          </a:xfrm>
+          <a:prstGeom prst="rect">
+            <a:avLst/>
+          </a:prstGeom>
+          <a:noFill/>
+        </p:spPr>
+        <p:txBody>
+          <a:bodyPr wrap="none" rtlCol="0">
+            <a:spAutoFit/>
+          </a:bodyPr>
+          <a:lstStyle/>
+          <a:p>
+            <a:r>
+              <a:rPr lang="en-GB" dirty="0"/>
+              <a:t>Login/Register</a:t>
+            </a:r>
+          </a:p>
+        </p:txBody>
+      </p:sp>
+      <p:sp>
+        <p:nvSpPr>
+          <p:cNvPr id="10" name="TextBox 9">
+            <a:extLst>
+              <a:ext uri="{FF2B5EF4-FFF2-40B4-BE49-F238E27FC236}">
+                <a16:creationId xmlns:a16="http://schemas.microsoft.com/office/drawing/2014/main" id="{52D9E75F-BAF6-4789-908B-73AE07CC9145}"/>
+              </a:ext>
+            </a:extLst>
+          </p:cNvPr>
+          <p:cNvSpPr txBox="1"/>
+          <p:nvPr/>
+        </p:nvSpPr>
+        <p:spPr>
+          <a:xfrm>
+            <a:off x="3547108" y="1247099"/>
+            <a:ext cx="1348575" cy="369332"/>
+          </a:xfrm>
+          <a:prstGeom prst="rect">
+            <a:avLst/>
+          </a:prstGeom>
+          <a:noFill/>
+        </p:spPr>
+        <p:txBody>
+          <a:bodyPr wrap="square" rtlCol="0">
+            <a:spAutoFit/>
+          </a:bodyPr>
+          <a:lstStyle/>
+          <a:p>
+            <a:r>
+              <a:rPr lang="en-GB" dirty="0"/>
+              <a:t>Home</a:t>
+            </a:r>
+          </a:p>
+        </p:txBody>
+      </p:sp>
+      <p:pic>
+        <p:nvPicPr>
+          <p:cNvPr id="11" name="Picture 10">
+            <a:extLst>
+              <a:ext uri="{FF2B5EF4-FFF2-40B4-BE49-F238E27FC236}">
+                <a16:creationId xmlns:a16="http://schemas.microsoft.com/office/drawing/2014/main" id="{45A28888-827B-4D8A-9817-DD17A9AFA92A}"/>
+              </a:ext>
+            </a:extLst>
+          </p:cNvPr>
+          <p:cNvPicPr>
+            <a:picLocks noChangeAspect="1"/>
+          </p:cNvPicPr>
+          <p:nvPr/>
+        </p:nvPicPr>
+        <p:blipFill>
+          <a:blip r:embed="rId5"/>
+          <a:stretch>
+            <a:fillRect/>
+          </a:stretch>
+        </p:blipFill>
+        <p:spPr>
+          <a:xfrm>
+            <a:off x="273310" y="1562655"/>
+            <a:ext cx="1692469" cy="892033"/>
+          </a:xfrm>
+          <a:prstGeom prst="rect">
+            <a:avLst/>
+          </a:prstGeom>
+        </p:spPr>
+      </p:pic>
+      <p:pic>
+        <p:nvPicPr>
+          <p:cNvPr id="12" name="Picture 11">
+            <a:extLst>
+              <a:ext uri="{FF2B5EF4-FFF2-40B4-BE49-F238E27FC236}">
+                <a16:creationId xmlns:a16="http://schemas.microsoft.com/office/drawing/2014/main" id="{19874CAE-D900-4998-B35D-5F2D8C82EF43}"/>
+              </a:ext>
+            </a:extLst>
+          </p:cNvPr>
+          <p:cNvPicPr>
+            <a:picLocks noChangeAspect="1"/>
+          </p:cNvPicPr>
+          <p:nvPr/>
+        </p:nvPicPr>
+        <p:blipFill>
+          <a:blip r:embed="rId6"/>
+          <a:stretch>
+            <a:fillRect/>
+          </a:stretch>
+        </p:blipFill>
+        <p:spPr>
+          <a:xfrm>
+            <a:off x="273311" y="2488243"/>
+            <a:ext cx="1692470" cy="969149"/>
+          </a:xfrm>
+          <a:prstGeom prst="rect">
+            <a:avLst/>
+          </a:prstGeom>
+        </p:spPr>
+      </p:pic>
+      <p:sp>
+        <p:nvSpPr>
+          <p:cNvPr id="14" name="Rectangle 13">
+            <a:extLst>
+              <a:ext uri="{FF2B5EF4-FFF2-40B4-BE49-F238E27FC236}">
+                <a16:creationId xmlns:a16="http://schemas.microsoft.com/office/drawing/2014/main" id="{C043984E-48A5-4E76-84F5-EB1FB94B80EF}"/>
+              </a:ext>
+            </a:extLst>
+          </p:cNvPr>
+          <p:cNvSpPr/>
+          <p:nvPr/>
+        </p:nvSpPr>
+        <p:spPr>
+          <a:xfrm>
+            <a:off x="34815" y="4592671"/>
+            <a:ext cx="11913514" cy="2217368"/>
+          </a:xfrm>
+          <a:prstGeom prst="rect">
+            <a:avLst/>
+          </a:prstGeom>
+          <a:solidFill>
+            <a:schemeClr val="accent3"/>
+          </a:solidFill>
+          <a:ln>
+            <a:noFill/>
+          </a:ln>
+        </p:spPr>
+        <p:style>
+          <a:lnRef idx="0">
+            <a:scrgbClr r="0" g="0" b="0"/>
+          </a:lnRef>
+          <a:fillRef idx="0">
+            <a:scrgbClr r="0" g="0" b="0"/>
+          </a:fillRef>
+          <a:effectRef idx="0">
+            <a:scrgbClr r="0" g="0" b="0"/>
+          </a:effectRef>
+          <a:fontRef idx="minor">
+            <a:schemeClr val="lt1"/>
+          </a:fontRef>
+        </p:style>
+        <p:txBody>
+          <a:bodyPr rtlCol="0" anchor="ctr"/>
+          <a:lstStyle/>
+          <a:p>
+            <a:pPr algn="ctr"/>
+            <a:endParaRPr lang="en-GB"/>
+          </a:p>
+        </p:txBody>
+      </p:sp>
+      <p:pic>
+        <p:nvPicPr>
+          <p:cNvPr id="15" name="Picture 14">
+            <a:extLst>
+              <a:ext uri="{FF2B5EF4-FFF2-40B4-BE49-F238E27FC236}">
+                <a16:creationId xmlns:a16="http://schemas.microsoft.com/office/drawing/2014/main" id="{769094B3-9760-4884-822F-F5BB466F09A7}"/>
+              </a:ext>
+            </a:extLst>
+          </p:cNvPr>
+          <p:cNvPicPr>
+            <a:picLocks noChangeAspect="1"/>
+          </p:cNvPicPr>
+          <p:nvPr/>
+        </p:nvPicPr>
+        <p:blipFill>
+          <a:blip r:embed="rId7"/>
+          <a:stretch>
+            <a:fillRect/>
+          </a:stretch>
+        </p:blipFill>
+        <p:spPr>
+          <a:xfrm>
+            <a:off x="4804728" y="4832532"/>
+            <a:ext cx="1505092" cy="1209069"/>
+          </a:xfrm>
+          <a:prstGeom prst="rect">
+            <a:avLst/>
+          </a:prstGeom>
+        </p:spPr>
+      </p:pic>
+      <p:sp>
+        <p:nvSpPr>
+          <p:cNvPr id="16" name="TextBox 15">
+            <a:extLst>
+              <a:ext uri="{FF2B5EF4-FFF2-40B4-BE49-F238E27FC236}">
+                <a16:creationId xmlns:a16="http://schemas.microsoft.com/office/drawing/2014/main" id="{F14AFBBE-3EA4-4270-B210-F335F0E3FB7D}"/>
+              </a:ext>
+            </a:extLst>
+          </p:cNvPr>
+          <p:cNvSpPr txBox="1"/>
+          <p:nvPr/>
+        </p:nvSpPr>
+        <p:spPr>
+          <a:xfrm>
+            <a:off x="4847348" y="4236176"/>
+            <a:ext cx="1505092" cy="369332"/>
+          </a:xfrm>
+          <a:prstGeom prst="rect">
+            <a:avLst/>
+          </a:prstGeom>
+          <a:noFill/>
+        </p:spPr>
+        <p:txBody>
+          <a:bodyPr wrap="none" rtlCol="0">
+            <a:spAutoFit/>
+          </a:bodyPr>
+          <a:lstStyle/>
+          <a:p>
+            <a:r>
+              <a:rPr lang="en-GB" dirty="0"/>
+              <a:t>Modules Page</a:t>
+            </a:r>
+          </a:p>
+        </p:txBody>
+      </p:sp>
+      <p:sp>
+        <p:nvSpPr>
+          <p:cNvPr id="18" name="TextBox 17">
+            <a:extLst>
+              <a:ext uri="{FF2B5EF4-FFF2-40B4-BE49-F238E27FC236}">
+                <a16:creationId xmlns:a16="http://schemas.microsoft.com/office/drawing/2014/main" id="{68FCF61C-3FD0-4375-822B-BD1C5C05124A}"/>
+              </a:ext>
+            </a:extLst>
+          </p:cNvPr>
+          <p:cNvSpPr txBox="1"/>
+          <p:nvPr/>
+        </p:nvSpPr>
+        <p:spPr>
+          <a:xfrm>
+            <a:off x="10244735" y="4217395"/>
+            <a:ext cx="1947265" cy="369332"/>
+          </a:xfrm>
+          <a:prstGeom prst="rect">
+            <a:avLst/>
+          </a:prstGeom>
+          <a:noFill/>
+        </p:spPr>
+        <p:txBody>
+          <a:bodyPr wrap="square" rtlCol="0">
+            <a:spAutoFit/>
+          </a:bodyPr>
+          <a:lstStyle/>
+          <a:p>
+            <a:r>
+              <a:rPr lang="en-GB" dirty="0"/>
+              <a:t>Help/Contact Page</a:t>
+            </a:r>
+          </a:p>
+        </p:txBody>
+      </p:sp>
+      <p:pic>
+        <p:nvPicPr>
+          <p:cNvPr id="20" name="Picture 19">
+            <a:extLst>
+              <a:ext uri="{FF2B5EF4-FFF2-40B4-BE49-F238E27FC236}">
+                <a16:creationId xmlns:a16="http://schemas.microsoft.com/office/drawing/2014/main" id="{6B30807D-BE55-4824-AB33-D1BD5814753C}"/>
+              </a:ext>
+            </a:extLst>
+          </p:cNvPr>
+          <p:cNvPicPr>
+            <a:picLocks noChangeAspect="1"/>
+          </p:cNvPicPr>
+          <p:nvPr/>
+        </p:nvPicPr>
+        <p:blipFill>
+          <a:blip r:embed="rId8"/>
+          <a:stretch>
+            <a:fillRect/>
+          </a:stretch>
+        </p:blipFill>
+        <p:spPr>
+          <a:xfrm>
+            <a:off x="10501392" y="4821589"/>
+            <a:ext cx="1289236" cy="1695694"/>
+          </a:xfrm>
+          <a:prstGeom prst="rect">
+            <a:avLst/>
+          </a:prstGeom>
+        </p:spPr>
+      </p:pic>
+      <p:pic>
+        <p:nvPicPr>
+          <p:cNvPr id="21" name="Picture 20">
+            <a:extLst>
+              <a:ext uri="{FF2B5EF4-FFF2-40B4-BE49-F238E27FC236}">
+                <a16:creationId xmlns:a16="http://schemas.microsoft.com/office/drawing/2014/main" id="{AC2EF7F8-4275-43F4-B02B-24CC0F19A081}"/>
+              </a:ext>
+            </a:extLst>
+          </p:cNvPr>
+          <p:cNvPicPr>
+            <a:picLocks noChangeAspect="1"/>
+          </p:cNvPicPr>
+          <p:nvPr/>
+        </p:nvPicPr>
+        <p:blipFill>
+          <a:blip r:embed="rId9"/>
+          <a:stretch>
+            <a:fillRect/>
+          </a:stretch>
+        </p:blipFill>
+        <p:spPr>
+          <a:xfrm>
+            <a:off x="6559888" y="4820239"/>
+            <a:ext cx="1934955" cy="1209069"/>
+          </a:xfrm>
+          <a:prstGeom prst="rect">
+            <a:avLst/>
+          </a:prstGeom>
+        </p:spPr>
+      </p:pic>
+      <p:sp>
+        <p:nvSpPr>
+          <p:cNvPr id="22" name="TextBox 21">
+            <a:extLst>
+              <a:ext uri="{FF2B5EF4-FFF2-40B4-BE49-F238E27FC236}">
+                <a16:creationId xmlns:a16="http://schemas.microsoft.com/office/drawing/2014/main" id="{65F84F53-6F54-4804-9419-B75C9DC0A1AE}"/>
+              </a:ext>
+            </a:extLst>
+          </p:cNvPr>
+          <p:cNvSpPr txBox="1"/>
+          <p:nvPr/>
+        </p:nvSpPr>
+        <p:spPr>
+          <a:xfrm>
+            <a:off x="6807289" y="4236176"/>
+            <a:ext cx="2241834" cy="369332"/>
+          </a:xfrm>
+          <a:prstGeom prst="rect">
+            <a:avLst/>
+          </a:prstGeom>
+          <a:noFill/>
+        </p:spPr>
+        <p:txBody>
+          <a:bodyPr wrap="square" rtlCol="0">
+            <a:spAutoFit/>
+          </a:bodyPr>
+          <a:lstStyle/>
+          <a:p>
+            <a:r>
+              <a:rPr lang="en-GB" dirty="0"/>
+              <a:t>Calendar Page</a:t>
+            </a:r>
+          </a:p>
+        </p:txBody>
+      </p:sp>
+      <p:pic>
+        <p:nvPicPr>
+          <p:cNvPr id="23" name="Picture 22">
+            <a:extLst>
+              <a:ext uri="{FF2B5EF4-FFF2-40B4-BE49-F238E27FC236}">
+                <a16:creationId xmlns:a16="http://schemas.microsoft.com/office/drawing/2014/main" id="{DADB0D1F-5983-4A05-85DD-C7D0765A0BDF}"/>
+              </a:ext>
+            </a:extLst>
+          </p:cNvPr>
+          <p:cNvPicPr>
+            <a:picLocks noChangeAspect="1"/>
+          </p:cNvPicPr>
+          <p:nvPr/>
+        </p:nvPicPr>
+        <p:blipFill>
+          <a:blip r:embed="rId6"/>
+          <a:stretch>
+            <a:fillRect/>
+          </a:stretch>
+        </p:blipFill>
+        <p:spPr>
+          <a:xfrm>
+            <a:off x="140777" y="5686823"/>
+            <a:ext cx="1655055" cy="1047924"/>
+          </a:xfrm>
+          <a:prstGeom prst="rect">
+            <a:avLst/>
+          </a:prstGeom>
+        </p:spPr>
+      </p:pic>
+      <p:pic>
+        <p:nvPicPr>
+          <p:cNvPr id="24" name="Picture 23">
+            <a:extLst>
+              <a:ext uri="{FF2B5EF4-FFF2-40B4-BE49-F238E27FC236}">
+                <a16:creationId xmlns:a16="http://schemas.microsoft.com/office/drawing/2014/main" id="{B4F65875-81C7-4B53-9BDC-980EF8609E01}"/>
+              </a:ext>
+            </a:extLst>
+          </p:cNvPr>
+          <p:cNvPicPr>
+            <a:picLocks noChangeAspect="1"/>
+          </p:cNvPicPr>
+          <p:nvPr/>
+        </p:nvPicPr>
+        <p:blipFill>
+          <a:blip r:embed="rId5"/>
+          <a:stretch>
+            <a:fillRect/>
+          </a:stretch>
+        </p:blipFill>
+        <p:spPr>
+          <a:xfrm>
+            <a:off x="140777" y="4628070"/>
+            <a:ext cx="1655054" cy="988178"/>
+          </a:xfrm>
+          <a:prstGeom prst="rect">
+            <a:avLst/>
+          </a:prstGeom>
+        </p:spPr>
+      </p:pic>
+      <p:pic>
+        <p:nvPicPr>
+          <p:cNvPr id="25" name="Picture 24">
+            <a:extLst>
+              <a:ext uri="{FF2B5EF4-FFF2-40B4-BE49-F238E27FC236}">
+                <a16:creationId xmlns:a16="http://schemas.microsoft.com/office/drawing/2014/main" id="{E687B923-713F-4C1C-9FE8-D9E317D40D5E}"/>
+              </a:ext>
+            </a:extLst>
+          </p:cNvPr>
+          <p:cNvPicPr>
+            <a:picLocks noChangeAspect="1"/>
+          </p:cNvPicPr>
+          <p:nvPr/>
+        </p:nvPicPr>
+        <p:blipFill>
+          <a:blip r:embed="rId4"/>
+          <a:stretch>
+            <a:fillRect/>
+          </a:stretch>
+        </p:blipFill>
+        <p:spPr>
+          <a:xfrm>
+            <a:off x="2079624" y="4719461"/>
+            <a:ext cx="2473715" cy="1525829"/>
+          </a:xfrm>
+          <a:prstGeom prst="rect">
+            <a:avLst/>
+          </a:prstGeom>
+        </p:spPr>
+      </p:pic>
+      <p:sp>
+        <p:nvSpPr>
+          <p:cNvPr id="26" name="TextBox 25">
+            <a:extLst>
+              <a:ext uri="{FF2B5EF4-FFF2-40B4-BE49-F238E27FC236}">
+                <a16:creationId xmlns:a16="http://schemas.microsoft.com/office/drawing/2014/main" id="{0B15152D-0C05-4490-A539-00F176DD059C}"/>
+              </a:ext>
+            </a:extLst>
+          </p:cNvPr>
+          <p:cNvSpPr txBox="1"/>
+          <p:nvPr/>
+        </p:nvSpPr>
+        <p:spPr>
+          <a:xfrm>
+            <a:off x="2974019" y="4205402"/>
+            <a:ext cx="1505092" cy="369332"/>
+          </a:xfrm>
+          <a:prstGeom prst="rect">
+            <a:avLst/>
+          </a:prstGeom>
+          <a:noFill/>
+        </p:spPr>
+        <p:txBody>
+          <a:bodyPr wrap="square" rtlCol="0">
+            <a:spAutoFit/>
+          </a:bodyPr>
+          <a:lstStyle/>
+          <a:p>
+            <a:r>
+              <a:rPr lang="en-GB" dirty="0"/>
+              <a:t>Home </a:t>
+            </a:r>
+          </a:p>
+        </p:txBody>
+      </p:sp>
+      <p:sp>
+        <p:nvSpPr>
+          <p:cNvPr id="27" name="TextBox 26">
+            <a:extLst>
+              <a:ext uri="{FF2B5EF4-FFF2-40B4-BE49-F238E27FC236}">
+                <a16:creationId xmlns:a16="http://schemas.microsoft.com/office/drawing/2014/main" id="{5563A8C0-822F-41B2-9FCF-B5E9F855CDC6}"/>
+              </a:ext>
+            </a:extLst>
+          </p:cNvPr>
+          <p:cNvSpPr txBox="1"/>
+          <p:nvPr/>
+        </p:nvSpPr>
+        <p:spPr>
+          <a:xfrm>
+            <a:off x="220359" y="4240030"/>
+            <a:ext cx="1612888" cy="646331"/>
+          </a:xfrm>
+          <a:prstGeom prst="rect">
+            <a:avLst/>
+          </a:prstGeom>
+          <a:noFill/>
+        </p:spPr>
+        <p:txBody>
+          <a:bodyPr wrap="square" rtlCol="0">
+            <a:spAutoFit/>
+          </a:bodyPr>
+          <a:lstStyle/>
+          <a:p>
+            <a:r>
+              <a:rPr lang="en-GB" dirty="0"/>
+              <a:t>Login/Register</a:t>
+            </a:r>
+          </a:p>
+          <a:p>
+            <a:endParaRPr lang="en-GB" dirty="0"/>
+          </a:p>
+        </p:txBody>
+      </p:sp>
+      <p:sp>
+        <p:nvSpPr>
+          <p:cNvPr id="29" name="TextBox 28">
+            <a:extLst>
+              <a:ext uri="{FF2B5EF4-FFF2-40B4-BE49-F238E27FC236}">
+                <a16:creationId xmlns:a16="http://schemas.microsoft.com/office/drawing/2014/main" id="{5F6803EA-7FDA-4359-B674-60320562AC9C}"/>
+              </a:ext>
+            </a:extLst>
+          </p:cNvPr>
+          <p:cNvSpPr txBox="1"/>
+          <p:nvPr/>
+        </p:nvSpPr>
+        <p:spPr>
+          <a:xfrm>
+            <a:off x="5871049" y="803578"/>
+            <a:ext cx="1955900" cy="369332"/>
+          </a:xfrm>
+          <a:prstGeom prst="rect">
+            <a:avLst/>
+          </a:prstGeom>
+          <a:noFill/>
+        </p:spPr>
+        <p:txBody>
+          <a:bodyPr wrap="square" rtlCol="0">
+            <a:spAutoFit/>
+          </a:bodyPr>
+          <a:lstStyle/>
+          <a:p>
+            <a:r>
+              <a:rPr lang="en-GB" b="1" u="sng" dirty="0">
+                <a:solidFill>
+                  <a:srgbClr val="FF0000"/>
+                </a:solidFill>
+              </a:rPr>
+              <a:t>NOW</a:t>
+            </a:r>
+          </a:p>
+        </p:txBody>
+      </p:sp>
+      <p:sp>
+        <p:nvSpPr>
+          <p:cNvPr id="30" name="TextBox 29">
+            <a:extLst>
+              <a:ext uri="{FF2B5EF4-FFF2-40B4-BE49-F238E27FC236}">
+                <a16:creationId xmlns:a16="http://schemas.microsoft.com/office/drawing/2014/main" id="{EC8B66C2-B9C1-4B9E-B890-ED761B161778}"/>
+              </a:ext>
+            </a:extLst>
+          </p:cNvPr>
+          <p:cNvSpPr txBox="1"/>
+          <p:nvPr/>
+        </p:nvSpPr>
+        <p:spPr>
+          <a:xfrm>
+            <a:off x="5948952" y="3754786"/>
+            <a:ext cx="721736" cy="369332"/>
+          </a:xfrm>
+          <a:prstGeom prst="rect">
+            <a:avLst/>
+          </a:prstGeom>
+          <a:noFill/>
+        </p:spPr>
+        <p:txBody>
+          <a:bodyPr wrap="none" rtlCol="0">
+            <a:spAutoFit/>
+          </a:bodyPr>
+          <a:lstStyle/>
+          <a:p>
+            <a:r>
+              <a:rPr lang="en-GB" b="1" u="sng" dirty="0">
+                <a:solidFill>
+                  <a:srgbClr val="FF0000"/>
+                </a:solidFill>
+              </a:rPr>
+              <a:t>GOAL</a:t>
+            </a:r>
+          </a:p>
+        </p:txBody>
+      </p:sp>
+      <p:sp>
+        <p:nvSpPr>
+          <p:cNvPr id="31" name="TextBox 30">
+            <a:extLst>
+              <a:ext uri="{FF2B5EF4-FFF2-40B4-BE49-F238E27FC236}">
+                <a16:creationId xmlns:a16="http://schemas.microsoft.com/office/drawing/2014/main" id="{DA3859E4-BC13-48F0-B5AF-BF342985E81A}"/>
+              </a:ext>
+            </a:extLst>
+          </p:cNvPr>
+          <p:cNvSpPr txBox="1"/>
+          <p:nvPr/>
+        </p:nvSpPr>
+        <p:spPr>
+          <a:xfrm>
+            <a:off x="8915924" y="4214371"/>
+            <a:ext cx="1356049" cy="369332"/>
+          </a:xfrm>
+          <a:prstGeom prst="rect">
+            <a:avLst/>
+          </a:prstGeom>
+          <a:noFill/>
+        </p:spPr>
+        <p:txBody>
+          <a:bodyPr wrap="square" rtlCol="0">
+            <a:spAutoFit/>
+          </a:bodyPr>
+          <a:lstStyle/>
+          <a:p>
+            <a:r>
+              <a:rPr lang="en-GB" dirty="0"/>
+              <a:t>Chat Page</a:t>
+            </a:r>
+          </a:p>
+        </p:txBody>
+      </p:sp>
+      <p:pic>
+        <p:nvPicPr>
+          <p:cNvPr id="34" name="Picture 33" descr="Graphical user interface, text&#10;&#10;Description automatically generated">
+            <a:extLst>
+              <a:ext uri="{FF2B5EF4-FFF2-40B4-BE49-F238E27FC236}">
+                <a16:creationId xmlns:a16="http://schemas.microsoft.com/office/drawing/2014/main" id="{9BC0AA63-586F-4E57-B83B-A4DFD9248840}"/>
+              </a:ext>
+            </a:extLst>
+          </p:cNvPr>
+          <p:cNvPicPr>
+            <a:picLocks noChangeAspect="1"/>
+          </p:cNvPicPr>
+          <p:nvPr/>
+        </p:nvPicPr>
+        <p:blipFill>
+          <a:blip r:embed="rId10">
+            <a:extLst>
+              <a:ext uri="{28A0092B-C50C-407E-A947-70E740481C1C}">
+                <a14:useLocalDpi xmlns:a14="http://schemas.microsoft.com/office/drawing/2010/main" val="0"/>
+              </a:ext>
+            </a:extLst>
+          </a:blip>
+          <a:stretch>
+            <a:fillRect/>
+          </a:stretch>
+        </p:blipFill>
+        <p:spPr>
+          <a:xfrm>
+            <a:off x="8744911" y="4762665"/>
+            <a:ext cx="1456440" cy="1980700"/>
+          </a:xfrm>
+          <a:prstGeom prst="rect">
+            <a:avLst/>
+          </a:prstGeom>
+        </p:spPr>
+      </p:pic>
+    </p:spTree>
+    <p:extLst>
+      <p:ext uri="{BB962C8B-B14F-4D97-AF65-F5344CB8AC3E}">
+        <p14:creationId xmlns:p14="http://schemas.microsoft.com/office/powerpoint/2010/main" val="147877769"/>
+      </p:ext>
+    </p:extLst>
+  </p:cSld>
+  <p:clrMapOvr>
+    <a:masterClrMapping/>
+  </p:clrMapOvr>
+</p:sld>
+</file>
+
+<file path=ppt/slides/slide11.xml><?xml version="1.0" encoding="utf-8"?>
+<p:sld xmlns:a="http://schemas.openxmlformats.org/drawingml/2006/main" xmlns:r="http://schemas.openxmlformats.org/officeDocument/2006/relationships" xmlns:p="http://schemas.openxmlformats.org/presentationml/2006/main">
+  <p:cSld>
+    <p:spTree>
+      <p:nvGrpSpPr>
+        <p:cNvPr id="1" name=""/>
+        <p:cNvGrpSpPr/>
+        <p:nvPr/>
+      </p:nvGrpSpPr>
+      <p:grpSpPr>
+        <a:xfrm>
+          <a:off x="0" y="0"/>
+          <a:ext cx="0" cy="0"/>
+          <a:chOff x="0" y="0"/>
+          <a:chExt cx="0" cy="0"/>
+        </a:xfrm>
+      </p:grpSpPr>
+      <p:sp>
+        <p:nvSpPr>
           <p:cNvPr id="2" name="Title 1">
             <a:extLst>
               <a:ext uri="{FF2B5EF4-FFF2-40B4-BE49-F238E27FC236}">
@@ -4027,9 +4996,16 @@
             <p:ph type="title"/>
           </p:nvPr>
         </p:nvSpPr>
-        <p:spPr/>
-        <p:txBody>
-          <a:bodyPr/>
+        <p:spPr>
+          <a:xfrm>
+            <a:off x="489857" y="143069"/>
+            <a:ext cx="10515600" cy="671804"/>
+          </a:xfrm>
+        </p:spPr>
+        <p:txBody>
+          <a:bodyPr>
+            <a:normAutofit fontScale="90000"/>
+          </a:bodyPr>
           <a:lstStyle/>
           <a:p>
             <a:br>
@@ -4039,6 +5015,17 @@
               <a:rPr lang="en-IE" dirty="0"/>
               <a:t>Objectives</a:t>
             </a:r>
+            <a:br>
+              <a:rPr lang="en-IE" dirty="0"/>
+            </a:br>
+            <a:r>
+              <a:rPr lang="en-IE" sz="1800" dirty="0">
+                <a:solidFill>
+                  <a:srgbClr val="FF0000"/>
+                </a:solidFill>
+              </a:rPr>
+              <a:t>Goals for overall Project</a:t>
+            </a:r>
           </a:p>
         </p:txBody>
       </p:sp>
@@ -4065,7 +5052,11 @@
           <a:p>
             <a:r>
               <a:rPr lang="en-IE" dirty="0"/>
-              <a:t>Website for Students</a:t>
+              <a:t>Website for Students –</a:t>
+            </a:r>
+            <a:r>
+              <a:rPr lang="en-IE" sz="2000" dirty="0"/>
+              <a:t> place to go for resources/help –a students go to Application!</a:t>
             </a:r>
           </a:p>
           <a:p>
@@ -4077,7 +5068,45 @@
           <a:p>
             <a:r>
               <a:rPr lang="en-IE" dirty="0"/>
-              <a:t>Chat with other students</a:t>
+              <a:t>Chat with other students for different purposes :</a:t>
+            </a:r>
+          </a:p>
+          <a:p>
+            <a:pPr marL="971550" lvl="1" indent="-514350">
+              <a:buFont typeface="+mj-lt"/>
+              <a:buAutoNum type="arabicPeriod"/>
+            </a:pPr>
+            <a:r>
+              <a:rPr lang="en-IE" sz="2000" dirty="0"/>
+              <a:t>Let people know of changes (</a:t>
+            </a:r>
+            <a:r>
+              <a:rPr lang="en-IE" sz="2000" dirty="0" err="1"/>
+              <a:t>eg</a:t>
+            </a:r>
+            <a:r>
+              <a:rPr lang="en-IE" sz="2000" dirty="0"/>
+              <a:t>: Timetable/exams)</a:t>
+            </a:r>
+          </a:p>
+          <a:p>
+            <a:pPr marL="971550" lvl="1" indent="-514350">
+              <a:buFont typeface="+mj-lt"/>
+              <a:buAutoNum type="arabicPeriod"/>
+            </a:pPr>
+            <a:r>
+              <a:rPr lang="en-IE" sz="2000" dirty="0"/>
+              <a:t>Video call (Improve Communication)	</a:t>
+            </a:r>
+          </a:p>
+          <a:p>
+            <a:pPr marL="971550" lvl="1" indent="-514350">
+              <a:buFont typeface="+mj-lt"/>
+              <a:buAutoNum type="arabicPeriod"/>
+            </a:pPr>
+            <a:r>
+              <a:rPr lang="en-IE" sz="2000" dirty="0"/>
+              <a:t>Keep Students on top of there classes and not fall behind</a:t>
             </a:r>
           </a:p>
           <a:p>
@@ -4267,40 +5296,71 @@
             <p:ph type="title"/>
           </p:nvPr>
         </p:nvSpPr>
-        <p:spPr/>
-        <p:txBody>
-          <a:bodyPr/>
-          <a:lstStyle/>
-          <a:p>
-            <a:endParaRPr lang="en-IE"/>
-          </a:p>
-        </p:txBody>
-      </p:sp>
-      <p:sp>
-        <p:nvSpPr>
-          <p:cNvPr id="4" name="Content Placeholder 3">
-            <a:extLst>
-              <a:ext uri="{FF2B5EF4-FFF2-40B4-BE49-F238E27FC236}">
-                <a16:creationId xmlns:a16="http://schemas.microsoft.com/office/drawing/2014/main" id="{4CFD6A21-D3B5-466A-ADB8-CE99F88E8993}"/>
-              </a:ext>
-            </a:extLst>
-          </p:cNvPr>
-          <p:cNvSpPr>
-            <a:spLocks noGrp="1"/>
-          </p:cNvSpPr>
+        <p:spPr>
+          <a:xfrm>
+            <a:off x="713261" y="529586"/>
+            <a:ext cx="10515600" cy="708276"/>
+          </a:xfrm>
+        </p:spPr>
+        <p:txBody>
+          <a:bodyPr>
+            <a:normAutofit fontScale="90000"/>
+          </a:bodyPr>
+          <a:lstStyle/>
+          <a:p>
+            <a:r>
+              <a:rPr lang="en-IE" dirty="0"/>
+              <a:t>AWS Cloud</a:t>
+            </a:r>
+            <a:br>
+              <a:rPr lang="en-IE" dirty="0"/>
+            </a:br>
+            <a:r>
+              <a:rPr lang="en-IE" sz="1800" dirty="0">
+                <a:solidFill>
+                  <a:srgbClr val="FF0000"/>
+                </a:solidFill>
+              </a:rPr>
+              <a:t>Web Services</a:t>
+            </a:r>
+          </a:p>
+        </p:txBody>
+      </p:sp>
+      <p:pic>
+        <p:nvPicPr>
+          <p:cNvPr id="5" name="Content Placeholder 4" descr="A screenshot of a cell phone&#10;&#10;Description automatically generated">
+            <a:extLst>
+              <a:ext uri="{FF2B5EF4-FFF2-40B4-BE49-F238E27FC236}">
+                <a16:creationId xmlns:a16="http://schemas.microsoft.com/office/drawing/2014/main" id="{A587E788-35E7-44BB-9713-B8E3EF7D46D7}"/>
+              </a:ext>
+            </a:extLst>
+          </p:cNvPr>
+          <p:cNvPicPr>
+            <a:picLocks noGrp="1" noChangeAspect="1"/>
+          </p:cNvPicPr>
           <p:nvPr>
             <p:ph idx="1"/>
           </p:nvPr>
-        </p:nvSpPr>
-        <p:spPr/>
-        <p:txBody>
-          <a:bodyPr/>
-          <a:lstStyle/>
-          <a:p>
-            <a:endParaRPr lang="en-IE"/>
-          </a:p>
-        </p:txBody>
-      </p:sp>
+        </p:nvPicPr>
+        <p:blipFill>
+          <a:blip r:embed="rId2">
+            <a:extLst>
+              <a:ext uri="{28A0092B-C50C-407E-A947-70E740481C1C}">
+                <a14:useLocalDpi xmlns:a14="http://schemas.microsoft.com/office/drawing/2010/main" val="0"/>
+              </a:ext>
+            </a:extLst>
+          </a:blip>
+          <a:stretch>
+            <a:fillRect/>
+          </a:stretch>
+        </p:blipFill>
+        <p:spPr>
+          <a:xfrm>
+            <a:off x="713261" y="1644605"/>
+            <a:ext cx="10525334" cy="5065210"/>
+          </a:xfrm>
+        </p:spPr>
+      </p:pic>
     </p:spTree>
     <p:extLst>
       <p:ext uri="{BB962C8B-B14F-4D97-AF65-F5344CB8AC3E}">
@@ -4336,7 +5396,7 @@
           <p:cNvPr id="2" name="Title 1">
             <a:extLst>
               <a:ext uri="{FF2B5EF4-FFF2-40B4-BE49-F238E27FC236}">
-                <a16:creationId xmlns:a16="http://schemas.microsoft.com/office/drawing/2014/main" id="{93BCBDA6-34DA-4D62-BBAA-56743EA7F26D}"/>
+                <a16:creationId xmlns:a16="http://schemas.microsoft.com/office/drawing/2014/main" id="{C207F6EF-177B-4AEC-B6BA-57A946D715BF}"/>
               </a:ext>
             </a:extLst>
           </p:cNvPr>
@@ -4347,25 +5407,48 @@
             <p:ph type="title"/>
           </p:nvPr>
         </p:nvSpPr>
-        <p:spPr/>
+        <p:spPr>
+          <a:xfrm>
+            <a:off x="207273" y="132493"/>
+            <a:ext cx="10515600" cy="1055606"/>
+          </a:xfrm>
+        </p:spPr>
         <p:txBody>
           <a:bodyPr/>
           <a:lstStyle/>
           <a:p>
-            <a:pPr algn="ctr"/>
-            <a:r>
-              <a:rPr lang="en-IE" dirty="0"/>
-              <a:t>StudentMania</a:t>
+            <a:r>
+              <a:rPr lang="en-GB" dirty="0"/>
+              <a:t>S3 Bucket</a:t>
+            </a:r>
+            <a:br>
+              <a:rPr lang="en-GB" dirty="0"/>
+            </a:br>
+            <a:r>
+              <a:rPr lang="en-GB" sz="1800" dirty="0">
+                <a:solidFill>
+                  <a:srgbClr val="FF0000"/>
+                </a:solidFill>
+              </a:rPr>
+              <a:t>Storing </a:t>
+            </a:r>
+            <a:r>
+              <a:rPr lang="en-GB" sz="1600" dirty="0">
+                <a:solidFill>
+                  <a:srgbClr val="FF0000"/>
+                </a:solidFill>
+              </a:rPr>
+              <a:t>Website</a:t>
             </a:r>
           </a:p>
         </p:txBody>
       </p:sp>
       <p:pic>
         <p:nvPicPr>
-          <p:cNvPr id="5" name="Content Placeholder 4" descr="Graphical user interface, website&#10;&#10;Description automatically generated">
-            <a:extLst>
-              <a:ext uri="{FF2B5EF4-FFF2-40B4-BE49-F238E27FC236}">
-                <a16:creationId xmlns:a16="http://schemas.microsoft.com/office/drawing/2014/main" id="{9A30B86A-4C30-4497-8372-86D091227E1B}"/>
+          <p:cNvPr id="7" name="Content Placeholder 6" descr="Graphical user interface, application&#10;&#10;Description automatically generated">
+            <a:extLst>
+              <a:ext uri="{FF2B5EF4-FFF2-40B4-BE49-F238E27FC236}">
+                <a16:creationId xmlns:a16="http://schemas.microsoft.com/office/drawing/2014/main" id="{90B6CCEA-ADFF-433F-B33C-C1CB90635427}"/>
               </a:ext>
             </a:extLst>
           </p:cNvPr>
@@ -4390,15 +5473,15 @@
         </p:blipFill>
         <p:spPr>
           <a:xfrm>
-            <a:off x="980587" y="1825624"/>
-            <a:ext cx="10206221" cy="5699672"/>
+            <a:off x="256558" y="1458055"/>
+            <a:ext cx="11728169" cy="5297844"/>
           </a:xfrm>
         </p:spPr>
       </p:pic>
     </p:spTree>
     <p:extLst>
       <p:ext uri="{BB962C8B-B14F-4D97-AF65-F5344CB8AC3E}">
-        <p14:creationId xmlns:p14="http://schemas.microsoft.com/office/powerpoint/2010/main" val="814710051"/>
+        <p14:creationId xmlns:p14="http://schemas.microsoft.com/office/powerpoint/2010/main" val="884537676"/>
       </p:ext>
     </p:extLst>
   </p:cSld>
@@ -4430,7 +5513,7 @@
           <p:cNvPr id="2" name="Title 1">
             <a:extLst>
               <a:ext uri="{FF2B5EF4-FFF2-40B4-BE49-F238E27FC236}">
-                <a16:creationId xmlns:a16="http://schemas.microsoft.com/office/drawing/2014/main" id="{B70B6794-6443-40C1-BF14-DF19F2A8526E}"/>
+                <a16:creationId xmlns:a16="http://schemas.microsoft.com/office/drawing/2014/main" id="{3589AAC5-A210-4F71-A364-D2B32C24430D}"/>
               </a:ext>
             </a:extLst>
           </p:cNvPr>
@@ -4441,46 +5524,77 @@
             <p:ph type="title"/>
           </p:nvPr>
         </p:nvSpPr>
-        <p:spPr/>
-        <p:txBody>
-          <a:bodyPr/>
-          <a:lstStyle/>
-          <a:p>
-            <a:endParaRPr lang="en-IE"/>
-          </a:p>
-        </p:txBody>
-      </p:sp>
-      <p:sp>
-        <p:nvSpPr>
-          <p:cNvPr id="3" name="Content Placeholder 2">
-            <a:extLst>
-              <a:ext uri="{FF2B5EF4-FFF2-40B4-BE49-F238E27FC236}">
-                <a16:creationId xmlns:a16="http://schemas.microsoft.com/office/drawing/2014/main" id="{4D969DC6-CAC5-449C-AC45-25732EF60AD0}"/>
-              </a:ext>
-            </a:extLst>
-          </p:cNvPr>
-          <p:cNvSpPr>
-            <a:spLocks noGrp="1"/>
-          </p:cNvSpPr>
-          <p:nvPr>
-            <p:ph idx="1"/>
-          </p:nvPr>
-        </p:nvSpPr>
-        <p:spPr/>
-        <p:txBody>
-          <a:bodyPr/>
-          <a:lstStyle/>
-          <a:p>
-            <a:endParaRPr lang="en-IE"/>
+        <p:spPr>
+          <a:xfrm>
+            <a:off x="147466" y="351968"/>
+            <a:ext cx="10515600" cy="772941"/>
+          </a:xfrm>
+        </p:spPr>
+        <p:txBody>
+          <a:bodyPr>
+            <a:normAutofit fontScale="90000"/>
+          </a:bodyPr>
+          <a:lstStyle/>
+          <a:p>
+            <a:r>
+              <a:rPr lang="en-GB" dirty="0"/>
+              <a:t>Route 53 </a:t>
+            </a:r>
+            <a:br>
+              <a:rPr lang="en-GB" dirty="0"/>
+            </a:br>
+            <a:r>
+              <a:rPr lang="en-GB" sz="1800" dirty="0">
+                <a:solidFill>
+                  <a:srgbClr val="FF0000"/>
+                </a:solidFill>
+              </a:rPr>
+              <a:t>Linking Website Bucket to custom GoDaddy Domain</a:t>
+            </a:r>
           </a:p>
         </p:txBody>
       </p:sp>
       <p:pic>
         <p:nvPicPr>
-          <p:cNvPr id="4" name="Picture 3">
-            <a:extLst>
-              <a:ext uri="{FF2B5EF4-FFF2-40B4-BE49-F238E27FC236}">
-                <a16:creationId xmlns:a16="http://schemas.microsoft.com/office/drawing/2014/main" id="{18FF8AF0-A639-4250-9BEC-BB98FC4B890D}"/>
+          <p:cNvPr id="5" name="Content Placeholder 4" descr="Graphical user interface&#10;&#10;Description automatically generated">
+            <a:extLst>
+              <a:ext uri="{FF2B5EF4-FFF2-40B4-BE49-F238E27FC236}">
+                <a16:creationId xmlns:a16="http://schemas.microsoft.com/office/drawing/2014/main" id="{022E0301-74A1-456D-A90B-F96F687265BD}"/>
+              </a:ext>
+            </a:extLst>
+          </p:cNvPr>
+          <p:cNvPicPr>
+            <a:picLocks noGrp="1" noChangeAspect="1"/>
+          </p:cNvPicPr>
+          <p:nvPr>
+            <p:ph idx="1"/>
+          </p:nvPr>
+        </p:nvPicPr>
+        <p:blipFill>
+          <a:blip r:embed="rId2">
+            <a:extLst>
+              <a:ext uri="{28A0092B-C50C-407E-A947-70E740481C1C}">
+                <a14:useLocalDpi xmlns:a14="http://schemas.microsoft.com/office/drawing/2010/main" val="0"/>
+              </a:ext>
+            </a:extLst>
+          </a:blip>
+          <a:stretch>
+            <a:fillRect/>
+          </a:stretch>
+        </p:blipFill>
+        <p:spPr>
+          <a:xfrm>
+            <a:off x="196761" y="1776373"/>
+            <a:ext cx="11798477" cy="4900697"/>
+          </a:xfrm>
+        </p:spPr>
+      </p:pic>
+      <p:pic>
+        <p:nvPicPr>
+          <p:cNvPr id="6" name="Picture 5">
+            <a:extLst>
+              <a:ext uri="{FF2B5EF4-FFF2-40B4-BE49-F238E27FC236}">
+                <a16:creationId xmlns:a16="http://schemas.microsoft.com/office/drawing/2014/main" id="{61B0E4C1-9958-4B81-A75E-5A882E323461}"/>
               </a:ext>
             </a:extLst>
           </p:cNvPr>
@@ -4490,15 +5604,15 @@
           <p:nvPr/>
         </p:nvPicPr>
         <p:blipFill>
-          <a:blip r:embed="rId2"/>
+          <a:blip r:embed="rId3"/>
           <a:stretch>
             <a:fillRect/>
           </a:stretch>
         </p:blipFill>
         <p:spPr>
           <a:xfrm>
-            <a:off x="0" y="113328"/>
-            <a:ext cx="12192000" cy="6631343"/>
+            <a:off x="214484" y="1545977"/>
+            <a:ext cx="2628900" cy="361950"/>
           </a:xfrm>
           <a:prstGeom prst="rect">
             <a:avLst/>
@@ -4508,7 +5622,7 @@
     </p:spTree>
     <p:extLst>
       <p:ext uri="{BB962C8B-B14F-4D97-AF65-F5344CB8AC3E}">
-        <p14:creationId xmlns:p14="http://schemas.microsoft.com/office/powerpoint/2010/main" val="147877769"/>
+        <p14:creationId xmlns:p14="http://schemas.microsoft.com/office/powerpoint/2010/main" val="3877538613"/>
       </p:ext>
     </p:extLst>
   </p:cSld>
@@ -4540,7 +5654,7 @@
           <p:cNvPr id="2" name="Title 1">
             <a:extLst>
               <a:ext uri="{FF2B5EF4-FFF2-40B4-BE49-F238E27FC236}">
-                <a16:creationId xmlns:a16="http://schemas.microsoft.com/office/drawing/2014/main" id="{7905BF36-F0D4-4874-BFE6-679B29D446B1}"/>
+                <a16:creationId xmlns:a16="http://schemas.microsoft.com/office/drawing/2014/main" id="{93BCBDA6-34DA-4D62-BBAA-56743EA7F26D}"/>
               </a:ext>
             </a:extLst>
           </p:cNvPr>
@@ -4556,41 +5670,55 @@
           <a:bodyPr/>
           <a:lstStyle/>
           <a:p>
-            <a:endParaRPr lang="en-IE"/>
-          </a:p>
-        </p:txBody>
-      </p:sp>
-      <p:sp>
-        <p:nvSpPr>
-          <p:cNvPr id="3" name="Content Placeholder 2">
-            <a:extLst>
-              <a:ext uri="{FF2B5EF4-FFF2-40B4-BE49-F238E27FC236}">
-                <a16:creationId xmlns:a16="http://schemas.microsoft.com/office/drawing/2014/main" id="{258FC59C-71EB-4AEA-93FD-2F9D9FD6A670}"/>
-              </a:ext>
-            </a:extLst>
-          </p:cNvPr>
-          <p:cNvSpPr>
-            <a:spLocks noGrp="1"/>
-          </p:cNvSpPr>
+            <a:pPr algn="ctr"/>
+            <a:r>
+              <a:rPr lang="en-IE" dirty="0"/>
+              <a:t>www.Student-Mania.com</a:t>
+            </a:r>
+          </a:p>
+        </p:txBody>
+      </p:sp>
+      <p:pic>
+        <p:nvPicPr>
+          <p:cNvPr id="5" name="Content Placeholder 4" descr="Graphical user interface, website&#10;&#10;Description automatically generated">
+            <a:extLst>
+              <a:ext uri="{FF2B5EF4-FFF2-40B4-BE49-F238E27FC236}">
+                <a16:creationId xmlns:a16="http://schemas.microsoft.com/office/drawing/2014/main" id="{9A30B86A-4C30-4497-8372-86D091227E1B}"/>
+              </a:ext>
+            </a:extLst>
+          </p:cNvPr>
+          <p:cNvPicPr>
+            <a:picLocks noGrp="1" noChangeAspect="1"/>
+          </p:cNvPicPr>
           <p:nvPr>
             <p:ph idx="1"/>
           </p:nvPr>
-        </p:nvSpPr>
-        <p:spPr/>
-        <p:txBody>
-          <a:bodyPr/>
-          <a:lstStyle/>
-          <a:p>
-            <a:endParaRPr lang="en-IE"/>
-          </a:p>
-        </p:txBody>
-      </p:sp>
+        </p:nvPicPr>
+        <p:blipFill>
+          <a:blip r:embed="rId2">
+            <a:extLst>
+              <a:ext uri="{28A0092B-C50C-407E-A947-70E740481C1C}">
+                <a14:useLocalDpi xmlns:a14="http://schemas.microsoft.com/office/drawing/2010/main" val="0"/>
+              </a:ext>
+            </a:extLst>
+          </a:blip>
+          <a:stretch>
+            <a:fillRect/>
+          </a:stretch>
+        </p:blipFill>
+        <p:spPr>
+          <a:xfrm>
+            <a:off x="152098" y="4067529"/>
+            <a:ext cx="4170515" cy="2501221"/>
+          </a:xfrm>
+        </p:spPr>
+      </p:pic>
       <p:pic>
         <p:nvPicPr>
           <p:cNvPr id="4" name="Picture 3">
             <a:extLst>
               <a:ext uri="{FF2B5EF4-FFF2-40B4-BE49-F238E27FC236}">
-                <a16:creationId xmlns:a16="http://schemas.microsoft.com/office/drawing/2014/main" id="{0F9EC2F3-E17B-4439-B112-F67BA10EB643}"/>
+                <a16:creationId xmlns:a16="http://schemas.microsoft.com/office/drawing/2014/main" id="{87A2377D-A4CB-403E-A423-CD243959E0D0}"/>
               </a:ext>
             </a:extLst>
           </p:cNvPr>
@@ -4600,25 +5728,323 @@
           <p:nvPr/>
         </p:nvPicPr>
         <p:blipFill>
-          <a:blip r:embed="rId2"/>
+          <a:blip r:embed="rId3">
+            <a:extLst>
+              <a:ext uri="{28A0092B-C50C-407E-A947-70E740481C1C}">
+                <a14:useLocalDpi xmlns:a14="http://schemas.microsoft.com/office/drawing/2010/main" val="0"/>
+              </a:ext>
+            </a:extLst>
+          </a:blip>
           <a:stretch>
             <a:fillRect/>
           </a:stretch>
         </p:blipFill>
         <p:spPr>
           <a:xfrm>
-            <a:off x="0" y="73602"/>
-            <a:ext cx="12192000" cy="6710795"/>
+            <a:off x="336203" y="2105349"/>
+            <a:ext cx="3607531" cy="543442"/>
           </a:xfrm>
           <a:prstGeom prst="rect">
             <a:avLst/>
           </a:prstGeom>
         </p:spPr>
       </p:pic>
+      <p:sp>
+        <p:nvSpPr>
+          <p:cNvPr id="9" name="TextBox 8">
+            <a:extLst>
+              <a:ext uri="{FF2B5EF4-FFF2-40B4-BE49-F238E27FC236}">
+                <a16:creationId xmlns:a16="http://schemas.microsoft.com/office/drawing/2014/main" id="{77116339-9B1E-4666-9DEE-8FD32C31FD54}"/>
+              </a:ext>
+            </a:extLst>
+          </p:cNvPr>
+          <p:cNvSpPr txBox="1"/>
+          <p:nvPr/>
+        </p:nvSpPr>
+        <p:spPr>
+          <a:xfrm>
+            <a:off x="4752394" y="1690688"/>
+            <a:ext cx="2189584" cy="369332"/>
+          </a:xfrm>
+          <a:prstGeom prst="rect">
+            <a:avLst/>
+          </a:prstGeom>
+          <a:noFill/>
+        </p:spPr>
+        <p:txBody>
+          <a:bodyPr wrap="square" rtlCol="0">
+            <a:spAutoFit/>
+          </a:bodyPr>
+          <a:lstStyle/>
+          <a:p>
+            <a:r>
+              <a:rPr lang="en-GB" dirty="0"/>
+              <a:t>Computer</a:t>
+            </a:r>
+          </a:p>
+        </p:txBody>
+      </p:sp>
+      <p:sp>
+        <p:nvSpPr>
+          <p:cNvPr id="10" name="TextBox 9">
+            <a:extLst>
+              <a:ext uri="{FF2B5EF4-FFF2-40B4-BE49-F238E27FC236}">
+                <a16:creationId xmlns:a16="http://schemas.microsoft.com/office/drawing/2014/main" id="{70759E6F-FAC0-4E45-8E44-3A6205D0C1FD}"/>
+              </a:ext>
+            </a:extLst>
+          </p:cNvPr>
+          <p:cNvSpPr txBox="1"/>
+          <p:nvPr/>
+        </p:nvSpPr>
+        <p:spPr>
+          <a:xfrm>
+            <a:off x="10413355" y="1674880"/>
+            <a:ext cx="1592424" cy="369332"/>
+          </a:xfrm>
+          <a:prstGeom prst="rect">
+            <a:avLst/>
+          </a:prstGeom>
+          <a:noFill/>
+        </p:spPr>
+        <p:txBody>
+          <a:bodyPr wrap="square" rtlCol="0">
+            <a:spAutoFit/>
+          </a:bodyPr>
+          <a:lstStyle/>
+          <a:p>
+            <a:r>
+              <a:rPr lang="en-GB" dirty="0"/>
+              <a:t>Mobile</a:t>
+            </a:r>
+          </a:p>
+        </p:txBody>
+      </p:sp>
+      <p:sp>
+        <p:nvSpPr>
+          <p:cNvPr id="12" name="TextBox 11">
+            <a:extLst>
+              <a:ext uri="{FF2B5EF4-FFF2-40B4-BE49-F238E27FC236}">
+                <a16:creationId xmlns:a16="http://schemas.microsoft.com/office/drawing/2014/main" id="{18513D01-FCA0-4F8F-AA7D-5330CB03F650}"/>
+              </a:ext>
+            </a:extLst>
+          </p:cNvPr>
+          <p:cNvSpPr txBox="1"/>
+          <p:nvPr/>
+        </p:nvSpPr>
+        <p:spPr>
+          <a:xfrm>
+            <a:off x="7650410" y="1695380"/>
+            <a:ext cx="755335" cy="369332"/>
+          </a:xfrm>
+          <a:prstGeom prst="rect">
+            <a:avLst/>
+          </a:prstGeom>
+          <a:noFill/>
+        </p:spPr>
+        <p:txBody>
+          <a:bodyPr wrap="none" rtlCol="0">
+            <a:spAutoFit/>
+          </a:bodyPr>
+          <a:lstStyle/>
+          <a:p>
+            <a:r>
+              <a:rPr lang="en-GB" dirty="0"/>
+              <a:t>Tablet</a:t>
+            </a:r>
+          </a:p>
+        </p:txBody>
+      </p:sp>
+      <p:pic>
+        <p:nvPicPr>
+          <p:cNvPr id="1026" name="Picture 2">
+            <a:extLst>
+              <a:ext uri="{FF2B5EF4-FFF2-40B4-BE49-F238E27FC236}">
+                <a16:creationId xmlns:a16="http://schemas.microsoft.com/office/drawing/2014/main" id="{E72C889D-83E8-43B8-9834-AAA2F27A2776}"/>
+              </a:ext>
+            </a:extLst>
+          </p:cNvPr>
+          <p:cNvPicPr>
+            <a:picLocks noChangeAspect="1" noChangeArrowheads="1"/>
+          </p:cNvPicPr>
+          <p:nvPr/>
+        </p:nvPicPr>
+        <p:blipFill>
+          <a:blip r:embed="rId4">
+            <a:extLst>
+              <a:ext uri="{28A0092B-C50C-407E-A947-70E740481C1C}">
+                <a14:useLocalDpi xmlns:a14="http://schemas.microsoft.com/office/drawing/2010/main" val="0"/>
+              </a:ext>
+            </a:extLst>
+          </a:blip>
+          <a:srcRect/>
+          <a:stretch>
+            <a:fillRect/>
+          </a:stretch>
+        </p:blipFill>
+        <p:spPr bwMode="auto">
+          <a:xfrm>
+            <a:off x="7109771" y="2328585"/>
+            <a:ext cx="1836612" cy="3797851"/>
+          </a:xfrm>
+          <a:prstGeom prst="rect">
+            <a:avLst/>
+          </a:prstGeom>
+          <a:noFill/>
+          <a:extLst>
+            <a:ext uri="{909E8E84-426E-40DD-AFC4-6F175D3DCCD1}">
+              <a14:hiddenFill xmlns:a14="http://schemas.microsoft.com/office/drawing/2010/main">
+                <a:solidFill>
+                  <a:srgbClr val="FFFFFF"/>
+                </a:solidFill>
+              </a14:hiddenFill>
+            </a:ext>
+          </a:extLst>
+        </p:spPr>
+      </p:pic>
+      <p:pic>
+        <p:nvPicPr>
+          <p:cNvPr id="1028" name="Picture 4" descr="No description available.">
+            <a:extLst>
+              <a:ext uri="{FF2B5EF4-FFF2-40B4-BE49-F238E27FC236}">
+                <a16:creationId xmlns:a16="http://schemas.microsoft.com/office/drawing/2014/main" id="{45D935D4-B778-4C27-A209-6207DF4AEE79}"/>
+              </a:ext>
+            </a:extLst>
+          </p:cNvPr>
+          <p:cNvPicPr>
+            <a:picLocks noChangeAspect="1" noChangeArrowheads="1"/>
+          </p:cNvPicPr>
+          <p:nvPr/>
+        </p:nvPicPr>
+        <p:blipFill>
+          <a:blip r:embed="rId5">
+            <a:extLst>
+              <a:ext uri="{28A0092B-C50C-407E-A947-70E740481C1C}">
+                <a14:useLocalDpi xmlns:a14="http://schemas.microsoft.com/office/drawing/2010/main" val="0"/>
+              </a:ext>
+            </a:extLst>
+          </a:blip>
+          <a:srcRect/>
+          <a:stretch>
+            <a:fillRect/>
+          </a:stretch>
+        </p:blipFill>
+        <p:spPr bwMode="auto">
+          <a:xfrm>
+            <a:off x="9590130" y="2328585"/>
+            <a:ext cx="2166441" cy="3798483"/>
+          </a:xfrm>
+          <a:prstGeom prst="rect">
+            <a:avLst/>
+          </a:prstGeom>
+          <a:noFill/>
+          <a:extLst>
+            <a:ext uri="{909E8E84-426E-40DD-AFC4-6F175D3DCCD1}">
+              <a14:hiddenFill xmlns:a14="http://schemas.microsoft.com/office/drawing/2010/main">
+                <a:solidFill>
+                  <a:srgbClr val="FFFFFF"/>
+                </a:solidFill>
+              </a14:hiddenFill>
+            </a:ext>
+          </a:extLst>
+        </p:spPr>
+      </p:pic>
+      <p:pic>
+        <p:nvPicPr>
+          <p:cNvPr id="1030" name="Picture 6">
+            <a:extLst>
+              <a:ext uri="{FF2B5EF4-FFF2-40B4-BE49-F238E27FC236}">
+                <a16:creationId xmlns:a16="http://schemas.microsoft.com/office/drawing/2014/main" id="{F698CF56-6091-482D-9C9C-C8716B49E868}"/>
+              </a:ext>
+            </a:extLst>
+          </p:cNvPr>
+          <p:cNvPicPr>
+            <a:picLocks noChangeAspect="1" noChangeArrowheads="1"/>
+          </p:cNvPicPr>
+          <p:nvPr/>
+        </p:nvPicPr>
+        <p:blipFill>
+          <a:blip r:embed="rId6">
+            <a:extLst>
+              <a:ext uri="{28A0092B-C50C-407E-A947-70E740481C1C}">
+                <a14:useLocalDpi xmlns:a14="http://schemas.microsoft.com/office/drawing/2010/main" val="0"/>
+              </a:ext>
+            </a:extLst>
+          </a:blip>
+          <a:srcRect/>
+          <a:stretch>
+            <a:fillRect/>
+          </a:stretch>
+        </p:blipFill>
+        <p:spPr bwMode="auto">
+          <a:xfrm>
+            <a:off x="4438569" y="2337623"/>
+            <a:ext cx="1865652" cy="3857903"/>
+          </a:xfrm>
+          <a:prstGeom prst="rect">
+            <a:avLst/>
+          </a:prstGeom>
+          <a:noFill/>
+          <a:extLst>
+            <a:ext uri="{909E8E84-426E-40DD-AFC4-6F175D3DCCD1}">
+              <a14:hiddenFill xmlns:a14="http://schemas.microsoft.com/office/drawing/2010/main">
+                <a:solidFill>
+                  <a:srgbClr val="FFFFFF"/>
+                </a:solidFill>
+              </a14:hiddenFill>
+            </a:ext>
+          </a:extLst>
+        </p:spPr>
+      </p:pic>
+      <p:sp>
+        <p:nvSpPr>
+          <p:cNvPr id="13" name="Arrow: Down 12">
+            <a:extLst>
+              <a:ext uri="{FF2B5EF4-FFF2-40B4-BE49-F238E27FC236}">
+                <a16:creationId xmlns:a16="http://schemas.microsoft.com/office/drawing/2014/main" id="{BA47A274-5AA7-475B-9A4F-D666FE6AF0E9}"/>
+              </a:ext>
+            </a:extLst>
+          </p:cNvPr>
+          <p:cNvSpPr/>
+          <p:nvPr/>
+        </p:nvSpPr>
+        <p:spPr>
+          <a:xfrm>
+            <a:off x="1931584" y="2861388"/>
+            <a:ext cx="416767" cy="945502"/>
+          </a:xfrm>
+          <a:prstGeom prst="downArrow">
+            <a:avLst/>
+          </a:prstGeom>
+        </p:spPr>
+        <p:style>
+          <a:lnRef idx="2">
+            <a:schemeClr val="accent1">
+              <a:shade val="50000"/>
+            </a:schemeClr>
+          </a:lnRef>
+          <a:fillRef idx="1">
+            <a:schemeClr val="accent1"/>
+          </a:fillRef>
+          <a:effectRef idx="0">
+            <a:schemeClr val="accent1"/>
+          </a:effectRef>
+          <a:fontRef idx="minor">
+            <a:schemeClr val="lt1"/>
+          </a:fontRef>
+        </p:style>
+        <p:txBody>
+          <a:bodyPr rtlCol="0" anchor="ctr"/>
+          <a:lstStyle/>
+          <a:p>
+            <a:pPr algn="ctr"/>
+            <a:endParaRPr lang="en-GB"/>
+          </a:p>
+        </p:txBody>
+      </p:sp>
     </p:spTree>
     <p:extLst>
       <p:ext uri="{BB962C8B-B14F-4D97-AF65-F5344CB8AC3E}">
-        <p14:creationId xmlns:p14="http://schemas.microsoft.com/office/powerpoint/2010/main" val="3413227417"/>
+        <p14:creationId xmlns:p14="http://schemas.microsoft.com/office/powerpoint/2010/main" val="814710051"/>
       </p:ext>
     </p:extLst>
   </p:cSld>
@@ -4668,7 +6094,7 @@
           <a:p>
             <a:r>
               <a:rPr lang="en-IE" dirty="0"/>
-              <a:t>Plan for semitrue 2 </a:t>
+              <a:t>Plan for semester 2 </a:t>
             </a:r>
           </a:p>
         </p:txBody>
@@ -4693,6 +6119,26 @@
         <p:txBody>
           <a:bodyPr/>
           <a:lstStyle/>
+          <a:p>
+            <a:r>
+              <a:rPr lang="en-IE" dirty="0"/>
+              <a:t>Login – </a:t>
+            </a:r>
+            <a:r>
+              <a:rPr lang="en-IE" sz="2400" i="1" dirty="0"/>
+              <a:t>functioning login</a:t>
+            </a:r>
+          </a:p>
+          <a:p>
+            <a:r>
+              <a:rPr lang="en-IE" dirty="0"/>
+              <a:t>Modules for student – </a:t>
+            </a:r>
+            <a:r>
+              <a:rPr lang="en-IE" sz="2400" i="1" dirty="0"/>
+              <a:t>students having there own section for each of there modules</a:t>
+            </a:r>
+          </a:p>
           <a:p>
             <a:r>
               <a:rPr lang="en-IE" dirty="0" err="1"/>
@@ -4700,35 +6146,28 @@
             </a:r>
             <a:r>
               <a:rPr lang="en-IE" dirty="0"/>
-              <a:t>?</a:t>
+              <a:t> – </a:t>
+            </a:r>
+            <a:r>
+              <a:rPr lang="en-IE" sz="2400" i="1" dirty="0"/>
+              <a:t>Getting communication between users in real time</a:t>
             </a:r>
           </a:p>
           <a:p>
             <a:r>
               <a:rPr lang="en-IE" dirty="0"/>
-              <a:t>Login?</a:t>
-            </a:r>
-          </a:p>
-          <a:p>
-            <a:r>
-              <a:rPr lang="en-IE" dirty="0"/>
-              <a:t>Video? </a:t>
-            </a:r>
-          </a:p>
-          <a:p>
+              <a:t>Video- </a:t>
+            </a:r>
+            <a:r>
+              <a:rPr lang="en-IE" sz="2400" dirty="0"/>
+              <a:t>allowing users to be able to Video call one another</a:t>
+            </a:r>
+          </a:p>
+          <a:p>
+            <a:pPr marL="0" indent="0">
+              <a:buNone/>
+            </a:pPr>
             <a:endParaRPr lang="en-IE" dirty="0"/>
-          </a:p>
-          <a:p>
-            <a:r>
-              <a:rPr lang="en-IE" dirty="0"/>
-              <a:t>Modules for student</a:t>
-            </a:r>
-          </a:p>
-          <a:p>
-            <a:r>
-              <a:rPr lang="en-IE" dirty="0"/>
-              <a:t>Help section</a:t>
-            </a:r>
           </a:p>
         </p:txBody>
       </p:sp>

</xml_diff>

<commit_message>
added web rtc part to slideshow
</commit_message>
<xml_diff>
--- a/Presentation/4th Year Presentation.pptx
+++ b/Presentation/4th Year Presentation.pptx
@@ -13,9 +13,10 @@
     <p:sldId id="266" r:id="rId7"/>
     <p:sldId id="267" r:id="rId8"/>
     <p:sldId id="258" r:id="rId9"/>
-    <p:sldId id="261" r:id="rId10"/>
-    <p:sldId id="259" r:id="rId11"/>
-    <p:sldId id="265" r:id="rId12"/>
+    <p:sldId id="259" r:id="rId10"/>
+    <p:sldId id="261" r:id="rId11"/>
+    <p:sldId id="268" r:id="rId12"/>
+    <p:sldId id="265" r:id="rId13"/>
   </p:sldIdLst>
   <p:sldSz cx="12192000" cy="6858000"/>
   <p:notesSz cx="6858000" cy="9144000"/>
@@ -127,8 +128,9 @@
             <p14:sldId id="266"/>
             <p14:sldId id="267"/>
             <p14:sldId id="258"/>
+            <p14:sldId id="259"/>
             <p14:sldId id="261"/>
-            <p14:sldId id="259"/>
+            <p14:sldId id="268"/>
             <p14:sldId id="265"/>
           </p14:sldIdLst>
         </p14:section>
@@ -3788,60 +3790,10 @@
       </p:grpSpPr>
       <p:sp>
         <p:nvSpPr>
-          <p:cNvPr id="13" name="Rectangle 12">
-            <a:extLst>
-              <a:ext uri="{FF2B5EF4-FFF2-40B4-BE49-F238E27FC236}">
-                <a16:creationId xmlns:a16="http://schemas.microsoft.com/office/drawing/2014/main" id="{8D415432-49E0-466F-A1A6-B45B23B79E2C}"/>
-              </a:ext>
-            </a:extLst>
-          </p:cNvPr>
-          <p:cNvSpPr/>
-          <p:nvPr/>
-        </p:nvSpPr>
-        <p:spPr>
-          <a:xfrm>
-            <a:off x="37454" y="1292507"/>
-            <a:ext cx="11913514" cy="2217368"/>
-          </a:xfrm>
-          <a:prstGeom prst="rect">
-            <a:avLst/>
-          </a:prstGeom>
-          <a:solidFill>
-            <a:schemeClr val="accent3"/>
-          </a:solidFill>
-          <a:ln>
-            <a:noFill/>
-          </a:ln>
-        </p:spPr>
-        <p:style>
-          <a:lnRef idx="0">
-            <a:scrgbClr r="0" g="0" b="0"/>
-          </a:lnRef>
-          <a:fillRef idx="0">
-            <a:scrgbClr r="0" g="0" b="0"/>
-          </a:fillRef>
-          <a:effectRef idx="0">
-            <a:scrgbClr r="0" g="0" b="0"/>
-          </a:effectRef>
-          <a:fontRef idx="minor">
-            <a:schemeClr val="lt1"/>
-          </a:fontRef>
-        </p:style>
-        <p:txBody>
-          <a:bodyPr rtlCol="0" anchor="ctr"/>
-          <a:lstStyle/>
-          <a:p>
-            <a:pPr algn="ctr"/>
-            <a:endParaRPr lang="en-GB"/>
-          </a:p>
-        </p:txBody>
-      </p:sp>
-      <p:sp>
-        <p:nvSpPr>
           <p:cNvPr id="2" name="Title 1">
             <a:extLst>
               <a:ext uri="{FF2B5EF4-FFF2-40B4-BE49-F238E27FC236}">
-                <a16:creationId xmlns:a16="http://schemas.microsoft.com/office/drawing/2014/main" id="{B70B6794-6443-40C1-BF14-DF19F2A8526E}"/>
+                <a16:creationId xmlns:a16="http://schemas.microsoft.com/office/drawing/2014/main" id="{6EF75AAA-22C8-471F-949E-26A1C6B6AC9D}"/>
               </a:ext>
             </a:extLst>
           </p:cNvPr>
@@ -3852,881 +3804,94 @@
             <p:ph type="title"/>
           </p:nvPr>
         </p:nvSpPr>
-        <p:spPr>
-          <a:xfrm>
-            <a:off x="0" y="0"/>
-            <a:ext cx="3547108" cy="958163"/>
-          </a:xfrm>
-        </p:spPr>
+        <p:spPr/>
         <p:txBody>
           <a:bodyPr/>
           <a:lstStyle/>
           <a:p>
             <a:r>
               <a:rPr lang="en-IE" dirty="0"/>
-              <a:t>Website Pages</a:t>
-            </a:r>
-            <a:endParaRPr lang="en-IE" sz="1600" u="sng" dirty="0">
-              <a:solidFill>
-                <a:srgbClr val="FF0000"/>
-              </a:solidFill>
-            </a:endParaRPr>
-          </a:p>
-        </p:txBody>
-      </p:sp>
-      <p:pic>
-        <p:nvPicPr>
-          <p:cNvPr id="4" name="Picture 3">
-            <a:extLst>
-              <a:ext uri="{FF2B5EF4-FFF2-40B4-BE49-F238E27FC236}">
-                <a16:creationId xmlns:a16="http://schemas.microsoft.com/office/drawing/2014/main" id="{18FF8AF0-A639-4250-9BEC-BB98FC4B890D}"/>
-              </a:ext>
-            </a:extLst>
-          </p:cNvPr>
-          <p:cNvPicPr>
-            <a:picLocks noChangeAspect="1"/>
-          </p:cNvPicPr>
-          <p:nvPr/>
-        </p:nvPicPr>
-        <p:blipFill>
-          <a:blip r:embed="rId2"/>
-          <a:stretch>
-            <a:fillRect/>
-          </a:stretch>
-        </p:blipFill>
-        <p:spPr>
-          <a:xfrm>
-            <a:off x="5487350" y="1688870"/>
-            <a:ext cx="2639878" cy="1607601"/>
-          </a:xfrm>
-          <a:prstGeom prst="rect">
-            <a:avLst/>
-          </a:prstGeom>
-        </p:spPr>
-      </p:pic>
-      <p:pic>
-        <p:nvPicPr>
-          <p:cNvPr id="5" name="Content Placeholder 4">
-            <a:extLst>
-              <a:ext uri="{FF2B5EF4-FFF2-40B4-BE49-F238E27FC236}">
-                <a16:creationId xmlns:a16="http://schemas.microsoft.com/office/drawing/2014/main" id="{40B284E9-9B91-41F7-852F-EB9FFCD946C0}"/>
-              </a:ext>
-            </a:extLst>
-          </p:cNvPr>
-          <p:cNvPicPr>
-            <a:picLocks noGrp="1" noChangeAspect="1"/>
-          </p:cNvPicPr>
+              <a:t>Plan for semester 2 </a:t>
+            </a:r>
+          </a:p>
+        </p:txBody>
+      </p:sp>
+      <p:sp>
+        <p:nvSpPr>
+          <p:cNvPr id="3" name="Content Placeholder 2">
+            <a:extLst>
+              <a:ext uri="{FF2B5EF4-FFF2-40B4-BE49-F238E27FC236}">
+                <a16:creationId xmlns:a16="http://schemas.microsoft.com/office/drawing/2014/main" id="{538E5270-E050-4D66-A739-B963C0744FBB}"/>
+              </a:ext>
+            </a:extLst>
+          </p:cNvPr>
+          <p:cNvSpPr>
+            <a:spLocks noGrp="1"/>
+          </p:cNvSpPr>
           <p:nvPr>
             <p:ph idx="1"/>
           </p:nvPr>
-        </p:nvPicPr>
-        <p:blipFill>
-          <a:blip r:embed="rId3"/>
-          <a:stretch>
-            <a:fillRect/>
-          </a:stretch>
-        </p:blipFill>
-        <p:spPr>
-          <a:xfrm>
-            <a:off x="9201621" y="1614499"/>
-            <a:ext cx="2399801" cy="1691032"/>
-          </a:xfrm>
-          <a:prstGeom prst="rect">
-            <a:avLst/>
-          </a:prstGeom>
-        </p:spPr>
-      </p:pic>
-      <p:sp>
-        <p:nvSpPr>
-          <p:cNvPr id="6" name="TextBox 5">
-            <a:extLst>
-              <a:ext uri="{FF2B5EF4-FFF2-40B4-BE49-F238E27FC236}">
-                <a16:creationId xmlns:a16="http://schemas.microsoft.com/office/drawing/2014/main" id="{D73F94B1-3ED6-42A0-A0B1-4EB88607CF5D}"/>
-              </a:ext>
-            </a:extLst>
-          </p:cNvPr>
-          <p:cNvSpPr txBox="1"/>
-          <p:nvPr/>
-        </p:nvSpPr>
-        <p:spPr>
-          <a:xfrm>
-            <a:off x="5871049" y="1246224"/>
-            <a:ext cx="2203770" cy="369332"/>
-          </a:xfrm>
-          <a:prstGeom prst="rect">
-            <a:avLst/>
-          </a:prstGeom>
-          <a:noFill/>
-        </p:spPr>
-        <p:txBody>
-          <a:bodyPr wrap="square" rtlCol="0">
-            <a:spAutoFit/>
-          </a:bodyPr>
-          <a:lstStyle/>
-          <a:p>
-            <a:r>
-              <a:rPr lang="en-GB" dirty="0"/>
-              <a:t>Calendar Page</a:t>
-            </a:r>
-          </a:p>
-        </p:txBody>
-      </p:sp>
-      <p:sp>
-        <p:nvSpPr>
-          <p:cNvPr id="7" name="TextBox 6">
-            <a:extLst>
-              <a:ext uri="{FF2B5EF4-FFF2-40B4-BE49-F238E27FC236}">
-                <a16:creationId xmlns:a16="http://schemas.microsoft.com/office/drawing/2014/main" id="{5D8FCDBB-782B-44AD-876A-ACD78649C362}"/>
-              </a:ext>
-            </a:extLst>
-          </p:cNvPr>
-          <p:cNvSpPr txBox="1"/>
-          <p:nvPr/>
-        </p:nvSpPr>
-        <p:spPr>
-          <a:xfrm>
-            <a:off x="9593949" y="1243881"/>
-            <a:ext cx="2455942" cy="369332"/>
-          </a:xfrm>
-          <a:prstGeom prst="rect">
-            <a:avLst/>
-          </a:prstGeom>
-          <a:noFill/>
-        </p:spPr>
-        <p:txBody>
-          <a:bodyPr wrap="square" rtlCol="0">
-            <a:spAutoFit/>
-          </a:bodyPr>
-          <a:lstStyle/>
-          <a:p>
-            <a:r>
-              <a:rPr lang="en-GB" dirty="0"/>
-              <a:t>Help /Contact Page</a:t>
-            </a:r>
-          </a:p>
-        </p:txBody>
-      </p:sp>
-      <p:pic>
-        <p:nvPicPr>
-          <p:cNvPr id="8" name="Picture 7">
-            <a:extLst>
-              <a:ext uri="{FF2B5EF4-FFF2-40B4-BE49-F238E27FC236}">
-                <a16:creationId xmlns:a16="http://schemas.microsoft.com/office/drawing/2014/main" id="{3675D92F-2215-4F04-8682-3F2A3AA2D4AF}"/>
-              </a:ext>
-            </a:extLst>
-          </p:cNvPr>
-          <p:cNvPicPr>
-            <a:picLocks noChangeAspect="1"/>
-          </p:cNvPicPr>
-          <p:nvPr/>
-        </p:nvPicPr>
-        <p:blipFill>
-          <a:blip r:embed="rId4"/>
-          <a:stretch>
-            <a:fillRect/>
-          </a:stretch>
-        </p:blipFill>
-        <p:spPr>
-          <a:xfrm>
-            <a:off x="2378341" y="1688870"/>
-            <a:ext cx="2696449" cy="1607601"/>
-          </a:xfrm>
-          <a:prstGeom prst="rect">
-            <a:avLst/>
-          </a:prstGeom>
-        </p:spPr>
-      </p:pic>
-      <p:sp>
-        <p:nvSpPr>
-          <p:cNvPr id="9" name="TextBox 8">
-            <a:extLst>
-              <a:ext uri="{FF2B5EF4-FFF2-40B4-BE49-F238E27FC236}">
-                <a16:creationId xmlns:a16="http://schemas.microsoft.com/office/drawing/2014/main" id="{5458793E-EABD-44DE-AF53-0820ECD3D6FE}"/>
-              </a:ext>
-            </a:extLst>
-          </p:cNvPr>
-          <p:cNvSpPr txBox="1"/>
-          <p:nvPr/>
-        </p:nvSpPr>
-        <p:spPr>
-          <a:xfrm>
-            <a:off x="307422" y="1241752"/>
-            <a:ext cx="1533305" cy="369332"/>
-          </a:xfrm>
-          <a:prstGeom prst="rect">
-            <a:avLst/>
-          </a:prstGeom>
-          <a:noFill/>
-        </p:spPr>
-        <p:txBody>
-          <a:bodyPr wrap="none" rtlCol="0">
-            <a:spAutoFit/>
-          </a:bodyPr>
-          <a:lstStyle/>
-          <a:p>
-            <a:r>
-              <a:rPr lang="en-GB" dirty="0"/>
-              <a:t>Login/Register</a:t>
-            </a:r>
-          </a:p>
-        </p:txBody>
-      </p:sp>
-      <p:sp>
-        <p:nvSpPr>
-          <p:cNvPr id="10" name="TextBox 9">
-            <a:extLst>
-              <a:ext uri="{FF2B5EF4-FFF2-40B4-BE49-F238E27FC236}">
-                <a16:creationId xmlns:a16="http://schemas.microsoft.com/office/drawing/2014/main" id="{52D9E75F-BAF6-4789-908B-73AE07CC9145}"/>
-              </a:ext>
-            </a:extLst>
-          </p:cNvPr>
-          <p:cNvSpPr txBox="1"/>
-          <p:nvPr/>
-        </p:nvSpPr>
-        <p:spPr>
-          <a:xfrm>
-            <a:off x="3547108" y="1247099"/>
-            <a:ext cx="1348575" cy="369332"/>
-          </a:xfrm>
-          <a:prstGeom prst="rect">
-            <a:avLst/>
-          </a:prstGeom>
-          <a:noFill/>
-        </p:spPr>
-        <p:txBody>
-          <a:bodyPr wrap="square" rtlCol="0">
-            <a:spAutoFit/>
-          </a:bodyPr>
-          <a:lstStyle/>
-          <a:p>
-            <a:r>
-              <a:rPr lang="en-GB" dirty="0"/>
-              <a:t>Home</a:t>
-            </a:r>
-          </a:p>
-        </p:txBody>
-      </p:sp>
-      <p:pic>
-        <p:nvPicPr>
-          <p:cNvPr id="11" name="Picture 10">
-            <a:extLst>
-              <a:ext uri="{FF2B5EF4-FFF2-40B4-BE49-F238E27FC236}">
-                <a16:creationId xmlns:a16="http://schemas.microsoft.com/office/drawing/2014/main" id="{45A28888-827B-4D8A-9817-DD17A9AFA92A}"/>
-              </a:ext>
-            </a:extLst>
-          </p:cNvPr>
-          <p:cNvPicPr>
-            <a:picLocks noChangeAspect="1"/>
-          </p:cNvPicPr>
-          <p:nvPr/>
-        </p:nvPicPr>
-        <p:blipFill>
-          <a:blip r:embed="rId5"/>
-          <a:stretch>
-            <a:fillRect/>
-          </a:stretch>
-        </p:blipFill>
-        <p:spPr>
-          <a:xfrm>
-            <a:off x="273310" y="1562655"/>
-            <a:ext cx="1692469" cy="892033"/>
-          </a:xfrm>
-          <a:prstGeom prst="rect">
-            <a:avLst/>
-          </a:prstGeom>
-        </p:spPr>
-      </p:pic>
-      <p:pic>
-        <p:nvPicPr>
-          <p:cNvPr id="12" name="Picture 11">
-            <a:extLst>
-              <a:ext uri="{FF2B5EF4-FFF2-40B4-BE49-F238E27FC236}">
-                <a16:creationId xmlns:a16="http://schemas.microsoft.com/office/drawing/2014/main" id="{19874CAE-D900-4998-B35D-5F2D8C82EF43}"/>
-              </a:ext>
-            </a:extLst>
-          </p:cNvPr>
-          <p:cNvPicPr>
-            <a:picLocks noChangeAspect="1"/>
-          </p:cNvPicPr>
-          <p:nvPr/>
-        </p:nvPicPr>
-        <p:blipFill>
-          <a:blip r:embed="rId6"/>
-          <a:stretch>
-            <a:fillRect/>
-          </a:stretch>
-        </p:blipFill>
-        <p:spPr>
-          <a:xfrm>
-            <a:off x="273311" y="2488243"/>
-            <a:ext cx="1692470" cy="969149"/>
-          </a:xfrm>
-          <a:prstGeom prst="rect">
-            <a:avLst/>
-          </a:prstGeom>
-        </p:spPr>
-      </p:pic>
-      <p:sp>
-        <p:nvSpPr>
-          <p:cNvPr id="14" name="Rectangle 13">
-            <a:extLst>
-              <a:ext uri="{FF2B5EF4-FFF2-40B4-BE49-F238E27FC236}">
-                <a16:creationId xmlns:a16="http://schemas.microsoft.com/office/drawing/2014/main" id="{C043984E-48A5-4E76-84F5-EB1FB94B80EF}"/>
-              </a:ext>
-            </a:extLst>
-          </p:cNvPr>
-          <p:cNvSpPr/>
-          <p:nvPr/>
-        </p:nvSpPr>
-        <p:spPr>
-          <a:xfrm>
-            <a:off x="34815" y="4592671"/>
-            <a:ext cx="11913514" cy="2217368"/>
-          </a:xfrm>
-          <a:prstGeom prst="rect">
-            <a:avLst/>
-          </a:prstGeom>
-          <a:solidFill>
-            <a:schemeClr val="accent3"/>
-          </a:solidFill>
-          <a:ln>
-            <a:noFill/>
-          </a:ln>
-        </p:spPr>
-        <p:style>
-          <a:lnRef idx="0">
-            <a:scrgbClr r="0" g="0" b="0"/>
-          </a:lnRef>
-          <a:fillRef idx="0">
-            <a:scrgbClr r="0" g="0" b="0"/>
-          </a:fillRef>
-          <a:effectRef idx="0">
-            <a:scrgbClr r="0" g="0" b="0"/>
-          </a:effectRef>
-          <a:fontRef idx="minor">
-            <a:schemeClr val="lt1"/>
-          </a:fontRef>
-        </p:style>
-        <p:txBody>
-          <a:bodyPr rtlCol="0" anchor="ctr"/>
-          <a:lstStyle/>
-          <a:p>
-            <a:pPr algn="ctr"/>
-            <a:endParaRPr lang="en-GB"/>
-          </a:p>
-        </p:txBody>
-      </p:sp>
-      <p:pic>
-        <p:nvPicPr>
-          <p:cNvPr id="15" name="Picture 14">
-            <a:extLst>
-              <a:ext uri="{FF2B5EF4-FFF2-40B4-BE49-F238E27FC236}">
-                <a16:creationId xmlns:a16="http://schemas.microsoft.com/office/drawing/2014/main" id="{769094B3-9760-4884-822F-F5BB466F09A7}"/>
-              </a:ext>
-            </a:extLst>
-          </p:cNvPr>
-          <p:cNvPicPr>
-            <a:picLocks noChangeAspect="1"/>
-          </p:cNvPicPr>
-          <p:nvPr/>
-        </p:nvPicPr>
-        <p:blipFill>
-          <a:blip r:embed="rId7"/>
-          <a:stretch>
-            <a:fillRect/>
-          </a:stretch>
-        </p:blipFill>
-        <p:spPr>
-          <a:xfrm>
-            <a:off x="4804728" y="4832532"/>
-            <a:ext cx="1505092" cy="1209069"/>
-          </a:xfrm>
-          <a:prstGeom prst="rect">
-            <a:avLst/>
-          </a:prstGeom>
-        </p:spPr>
-      </p:pic>
-      <p:sp>
-        <p:nvSpPr>
-          <p:cNvPr id="16" name="TextBox 15">
-            <a:extLst>
-              <a:ext uri="{FF2B5EF4-FFF2-40B4-BE49-F238E27FC236}">
-                <a16:creationId xmlns:a16="http://schemas.microsoft.com/office/drawing/2014/main" id="{F14AFBBE-3EA4-4270-B210-F335F0E3FB7D}"/>
-              </a:ext>
-            </a:extLst>
-          </p:cNvPr>
-          <p:cNvSpPr txBox="1"/>
-          <p:nvPr/>
-        </p:nvSpPr>
-        <p:spPr>
-          <a:xfrm>
-            <a:off x="4847348" y="4236176"/>
-            <a:ext cx="1505092" cy="369332"/>
-          </a:xfrm>
-          <a:prstGeom prst="rect">
-            <a:avLst/>
-          </a:prstGeom>
-          <a:noFill/>
-        </p:spPr>
-        <p:txBody>
-          <a:bodyPr wrap="none" rtlCol="0">
-            <a:spAutoFit/>
-          </a:bodyPr>
-          <a:lstStyle/>
-          <a:p>
-            <a:r>
-              <a:rPr lang="en-GB" dirty="0"/>
-              <a:t>Modules Page</a:t>
-            </a:r>
-          </a:p>
-        </p:txBody>
-      </p:sp>
-      <p:sp>
-        <p:nvSpPr>
-          <p:cNvPr id="18" name="TextBox 17">
-            <a:extLst>
-              <a:ext uri="{FF2B5EF4-FFF2-40B4-BE49-F238E27FC236}">
-                <a16:creationId xmlns:a16="http://schemas.microsoft.com/office/drawing/2014/main" id="{68FCF61C-3FD0-4375-822B-BD1C5C05124A}"/>
-              </a:ext>
-            </a:extLst>
-          </p:cNvPr>
-          <p:cNvSpPr txBox="1"/>
-          <p:nvPr/>
-        </p:nvSpPr>
-        <p:spPr>
-          <a:xfrm>
-            <a:off x="10244735" y="4217395"/>
-            <a:ext cx="1947265" cy="369332"/>
-          </a:xfrm>
-          <a:prstGeom prst="rect">
-            <a:avLst/>
-          </a:prstGeom>
-          <a:noFill/>
-        </p:spPr>
-        <p:txBody>
-          <a:bodyPr wrap="square" rtlCol="0">
-            <a:spAutoFit/>
-          </a:bodyPr>
-          <a:lstStyle/>
-          <a:p>
-            <a:r>
-              <a:rPr lang="en-GB" dirty="0"/>
-              <a:t>Help/Contact Page</a:t>
-            </a:r>
-          </a:p>
-        </p:txBody>
-      </p:sp>
-      <p:pic>
-        <p:nvPicPr>
-          <p:cNvPr id="20" name="Picture 19">
-            <a:extLst>
-              <a:ext uri="{FF2B5EF4-FFF2-40B4-BE49-F238E27FC236}">
-                <a16:creationId xmlns:a16="http://schemas.microsoft.com/office/drawing/2014/main" id="{6B30807D-BE55-4824-AB33-D1BD5814753C}"/>
-              </a:ext>
-            </a:extLst>
-          </p:cNvPr>
-          <p:cNvPicPr>
-            <a:picLocks noChangeAspect="1"/>
-          </p:cNvPicPr>
-          <p:nvPr/>
-        </p:nvPicPr>
-        <p:blipFill>
-          <a:blip r:embed="rId8"/>
-          <a:stretch>
-            <a:fillRect/>
-          </a:stretch>
-        </p:blipFill>
-        <p:spPr>
-          <a:xfrm>
-            <a:off x="10501392" y="4821589"/>
-            <a:ext cx="1289236" cy="1695694"/>
-          </a:xfrm>
-          <a:prstGeom prst="rect">
-            <a:avLst/>
-          </a:prstGeom>
-        </p:spPr>
-      </p:pic>
-      <p:pic>
-        <p:nvPicPr>
-          <p:cNvPr id="21" name="Picture 20">
-            <a:extLst>
-              <a:ext uri="{FF2B5EF4-FFF2-40B4-BE49-F238E27FC236}">
-                <a16:creationId xmlns:a16="http://schemas.microsoft.com/office/drawing/2014/main" id="{AC2EF7F8-4275-43F4-B02B-24CC0F19A081}"/>
-              </a:ext>
-            </a:extLst>
-          </p:cNvPr>
-          <p:cNvPicPr>
-            <a:picLocks noChangeAspect="1"/>
-          </p:cNvPicPr>
-          <p:nvPr/>
-        </p:nvPicPr>
-        <p:blipFill>
-          <a:blip r:embed="rId9"/>
-          <a:stretch>
-            <a:fillRect/>
-          </a:stretch>
-        </p:blipFill>
-        <p:spPr>
-          <a:xfrm>
-            <a:off x="6559888" y="4820239"/>
-            <a:ext cx="1934955" cy="1209069"/>
-          </a:xfrm>
-          <a:prstGeom prst="rect">
-            <a:avLst/>
-          </a:prstGeom>
-        </p:spPr>
-      </p:pic>
-      <p:sp>
-        <p:nvSpPr>
-          <p:cNvPr id="22" name="TextBox 21">
-            <a:extLst>
-              <a:ext uri="{FF2B5EF4-FFF2-40B4-BE49-F238E27FC236}">
-                <a16:creationId xmlns:a16="http://schemas.microsoft.com/office/drawing/2014/main" id="{65F84F53-6F54-4804-9419-B75C9DC0A1AE}"/>
-              </a:ext>
-            </a:extLst>
-          </p:cNvPr>
-          <p:cNvSpPr txBox="1"/>
-          <p:nvPr/>
-        </p:nvSpPr>
-        <p:spPr>
-          <a:xfrm>
-            <a:off x="6807289" y="4236176"/>
-            <a:ext cx="2241834" cy="369332"/>
-          </a:xfrm>
-          <a:prstGeom prst="rect">
-            <a:avLst/>
-          </a:prstGeom>
-          <a:noFill/>
-        </p:spPr>
-        <p:txBody>
-          <a:bodyPr wrap="square" rtlCol="0">
-            <a:spAutoFit/>
-          </a:bodyPr>
-          <a:lstStyle/>
-          <a:p>
-            <a:r>
-              <a:rPr lang="en-GB" dirty="0"/>
-              <a:t>Calendar Page</a:t>
-            </a:r>
-          </a:p>
-        </p:txBody>
-      </p:sp>
-      <p:pic>
-        <p:nvPicPr>
-          <p:cNvPr id="23" name="Picture 22">
-            <a:extLst>
-              <a:ext uri="{FF2B5EF4-FFF2-40B4-BE49-F238E27FC236}">
-                <a16:creationId xmlns:a16="http://schemas.microsoft.com/office/drawing/2014/main" id="{DADB0D1F-5983-4A05-85DD-C7D0765A0BDF}"/>
-              </a:ext>
-            </a:extLst>
-          </p:cNvPr>
-          <p:cNvPicPr>
-            <a:picLocks noChangeAspect="1"/>
-          </p:cNvPicPr>
-          <p:nvPr/>
-        </p:nvPicPr>
-        <p:blipFill>
-          <a:blip r:embed="rId6"/>
-          <a:stretch>
-            <a:fillRect/>
-          </a:stretch>
-        </p:blipFill>
-        <p:spPr>
-          <a:xfrm>
-            <a:off x="140777" y="5686823"/>
-            <a:ext cx="1655055" cy="1047924"/>
-          </a:xfrm>
-          <a:prstGeom prst="rect">
-            <a:avLst/>
-          </a:prstGeom>
-        </p:spPr>
-      </p:pic>
-      <p:pic>
-        <p:nvPicPr>
-          <p:cNvPr id="24" name="Picture 23">
-            <a:extLst>
-              <a:ext uri="{FF2B5EF4-FFF2-40B4-BE49-F238E27FC236}">
-                <a16:creationId xmlns:a16="http://schemas.microsoft.com/office/drawing/2014/main" id="{B4F65875-81C7-4B53-9BDC-980EF8609E01}"/>
-              </a:ext>
-            </a:extLst>
-          </p:cNvPr>
-          <p:cNvPicPr>
-            <a:picLocks noChangeAspect="1"/>
-          </p:cNvPicPr>
-          <p:nvPr/>
-        </p:nvPicPr>
-        <p:blipFill>
-          <a:blip r:embed="rId5"/>
-          <a:stretch>
-            <a:fillRect/>
-          </a:stretch>
-        </p:blipFill>
-        <p:spPr>
-          <a:xfrm>
-            <a:off x="140777" y="4628070"/>
-            <a:ext cx="1655054" cy="988178"/>
-          </a:xfrm>
-          <a:prstGeom prst="rect">
-            <a:avLst/>
-          </a:prstGeom>
-        </p:spPr>
-      </p:pic>
-      <p:pic>
-        <p:nvPicPr>
-          <p:cNvPr id="25" name="Picture 24">
-            <a:extLst>
-              <a:ext uri="{FF2B5EF4-FFF2-40B4-BE49-F238E27FC236}">
-                <a16:creationId xmlns:a16="http://schemas.microsoft.com/office/drawing/2014/main" id="{E687B923-713F-4C1C-9FE8-D9E317D40D5E}"/>
-              </a:ext>
-            </a:extLst>
-          </p:cNvPr>
-          <p:cNvPicPr>
-            <a:picLocks noChangeAspect="1"/>
-          </p:cNvPicPr>
-          <p:nvPr/>
-        </p:nvPicPr>
-        <p:blipFill>
-          <a:blip r:embed="rId4"/>
-          <a:stretch>
-            <a:fillRect/>
-          </a:stretch>
-        </p:blipFill>
-        <p:spPr>
-          <a:xfrm>
-            <a:off x="2079624" y="4719461"/>
-            <a:ext cx="2473715" cy="1525829"/>
-          </a:xfrm>
-          <a:prstGeom prst="rect">
-            <a:avLst/>
-          </a:prstGeom>
-        </p:spPr>
-      </p:pic>
-      <p:sp>
-        <p:nvSpPr>
-          <p:cNvPr id="26" name="TextBox 25">
-            <a:extLst>
-              <a:ext uri="{FF2B5EF4-FFF2-40B4-BE49-F238E27FC236}">
-                <a16:creationId xmlns:a16="http://schemas.microsoft.com/office/drawing/2014/main" id="{0B15152D-0C05-4490-A539-00F176DD059C}"/>
-              </a:ext>
-            </a:extLst>
-          </p:cNvPr>
-          <p:cNvSpPr txBox="1"/>
-          <p:nvPr/>
-        </p:nvSpPr>
-        <p:spPr>
-          <a:xfrm>
-            <a:off x="2974019" y="4205402"/>
-            <a:ext cx="1505092" cy="369332"/>
-          </a:xfrm>
-          <a:prstGeom prst="rect">
-            <a:avLst/>
-          </a:prstGeom>
-          <a:noFill/>
-        </p:spPr>
-        <p:txBody>
-          <a:bodyPr wrap="square" rtlCol="0">
-            <a:spAutoFit/>
-          </a:bodyPr>
-          <a:lstStyle/>
-          <a:p>
-            <a:r>
-              <a:rPr lang="en-GB" dirty="0"/>
-              <a:t>Home </a:t>
-            </a:r>
-          </a:p>
-        </p:txBody>
-      </p:sp>
-      <p:sp>
-        <p:nvSpPr>
-          <p:cNvPr id="27" name="TextBox 26">
-            <a:extLst>
-              <a:ext uri="{FF2B5EF4-FFF2-40B4-BE49-F238E27FC236}">
-                <a16:creationId xmlns:a16="http://schemas.microsoft.com/office/drawing/2014/main" id="{5563A8C0-822F-41B2-9FCF-B5E9F855CDC6}"/>
-              </a:ext>
-            </a:extLst>
-          </p:cNvPr>
-          <p:cNvSpPr txBox="1"/>
-          <p:nvPr/>
-        </p:nvSpPr>
-        <p:spPr>
-          <a:xfrm>
-            <a:off x="220359" y="4240030"/>
-            <a:ext cx="1612888" cy="646331"/>
-          </a:xfrm>
-          <a:prstGeom prst="rect">
-            <a:avLst/>
-          </a:prstGeom>
-          <a:noFill/>
-        </p:spPr>
-        <p:txBody>
-          <a:bodyPr wrap="square" rtlCol="0">
-            <a:spAutoFit/>
-          </a:bodyPr>
-          <a:lstStyle/>
-          <a:p>
-            <a:r>
-              <a:rPr lang="en-GB" dirty="0"/>
-              <a:t>Login/Register</a:t>
-            </a:r>
-          </a:p>
-          <a:p>
-            <a:endParaRPr lang="en-GB" dirty="0"/>
-          </a:p>
-        </p:txBody>
-      </p:sp>
-      <p:sp>
-        <p:nvSpPr>
-          <p:cNvPr id="29" name="TextBox 28">
-            <a:extLst>
-              <a:ext uri="{FF2B5EF4-FFF2-40B4-BE49-F238E27FC236}">
-                <a16:creationId xmlns:a16="http://schemas.microsoft.com/office/drawing/2014/main" id="{5F6803EA-7FDA-4359-B674-60320562AC9C}"/>
-              </a:ext>
-            </a:extLst>
-          </p:cNvPr>
-          <p:cNvSpPr txBox="1"/>
-          <p:nvPr/>
-        </p:nvSpPr>
-        <p:spPr>
-          <a:xfrm>
-            <a:off x="5871049" y="803578"/>
-            <a:ext cx="1955900" cy="369332"/>
-          </a:xfrm>
-          <a:prstGeom prst="rect">
-            <a:avLst/>
-          </a:prstGeom>
-          <a:noFill/>
-        </p:spPr>
-        <p:txBody>
-          <a:bodyPr wrap="square" rtlCol="0">
-            <a:spAutoFit/>
-          </a:bodyPr>
-          <a:lstStyle/>
-          <a:p>
-            <a:r>
-              <a:rPr lang="en-GB" b="1" u="sng" dirty="0">
-                <a:solidFill>
-                  <a:srgbClr val="FF0000"/>
-                </a:solidFill>
-              </a:rPr>
-              <a:t>NOW</a:t>
-            </a:r>
-          </a:p>
-        </p:txBody>
-      </p:sp>
-      <p:sp>
-        <p:nvSpPr>
-          <p:cNvPr id="30" name="TextBox 29">
-            <a:extLst>
-              <a:ext uri="{FF2B5EF4-FFF2-40B4-BE49-F238E27FC236}">
-                <a16:creationId xmlns:a16="http://schemas.microsoft.com/office/drawing/2014/main" id="{EC8B66C2-B9C1-4B9E-B890-ED761B161778}"/>
-              </a:ext>
-            </a:extLst>
-          </p:cNvPr>
-          <p:cNvSpPr txBox="1"/>
-          <p:nvPr/>
-        </p:nvSpPr>
-        <p:spPr>
-          <a:xfrm>
-            <a:off x="5948952" y="3754786"/>
-            <a:ext cx="721736" cy="369332"/>
-          </a:xfrm>
-          <a:prstGeom prst="rect">
-            <a:avLst/>
-          </a:prstGeom>
-          <a:noFill/>
-        </p:spPr>
-        <p:txBody>
-          <a:bodyPr wrap="none" rtlCol="0">
-            <a:spAutoFit/>
-          </a:bodyPr>
-          <a:lstStyle/>
-          <a:p>
-            <a:r>
-              <a:rPr lang="en-GB" b="1" u="sng" dirty="0">
-                <a:solidFill>
-                  <a:srgbClr val="FF0000"/>
-                </a:solidFill>
-              </a:rPr>
-              <a:t>GOAL</a:t>
-            </a:r>
-          </a:p>
-        </p:txBody>
-      </p:sp>
-      <p:sp>
-        <p:nvSpPr>
-          <p:cNvPr id="31" name="TextBox 30">
-            <a:extLst>
-              <a:ext uri="{FF2B5EF4-FFF2-40B4-BE49-F238E27FC236}">
-                <a16:creationId xmlns:a16="http://schemas.microsoft.com/office/drawing/2014/main" id="{DA3859E4-BC13-48F0-B5AF-BF342985E81A}"/>
-              </a:ext>
-            </a:extLst>
-          </p:cNvPr>
-          <p:cNvSpPr txBox="1"/>
-          <p:nvPr/>
-        </p:nvSpPr>
-        <p:spPr>
-          <a:xfrm>
-            <a:off x="8915924" y="4214371"/>
-            <a:ext cx="1356049" cy="369332"/>
-          </a:xfrm>
-          <a:prstGeom prst="rect">
-            <a:avLst/>
-          </a:prstGeom>
-          <a:noFill/>
-        </p:spPr>
-        <p:txBody>
-          <a:bodyPr wrap="square" rtlCol="0">
-            <a:spAutoFit/>
-          </a:bodyPr>
-          <a:lstStyle/>
-          <a:p>
-            <a:r>
-              <a:rPr lang="en-GB" dirty="0"/>
-              <a:t>Chat Page</a:t>
-            </a:r>
-          </a:p>
-        </p:txBody>
-      </p:sp>
-      <p:pic>
-        <p:nvPicPr>
-          <p:cNvPr id="34" name="Picture 33" descr="Graphical user interface, text&#10;&#10;Description automatically generated">
-            <a:extLst>
-              <a:ext uri="{FF2B5EF4-FFF2-40B4-BE49-F238E27FC236}">
-                <a16:creationId xmlns:a16="http://schemas.microsoft.com/office/drawing/2014/main" id="{9BC0AA63-586F-4E57-B83B-A4DFD9248840}"/>
-              </a:ext>
-            </a:extLst>
-          </p:cNvPr>
-          <p:cNvPicPr>
-            <a:picLocks noChangeAspect="1"/>
-          </p:cNvPicPr>
-          <p:nvPr/>
-        </p:nvPicPr>
-        <p:blipFill>
-          <a:blip r:embed="rId10">
-            <a:extLst>
-              <a:ext uri="{28A0092B-C50C-407E-A947-70E740481C1C}">
-                <a14:useLocalDpi xmlns:a14="http://schemas.microsoft.com/office/drawing/2010/main" val="0"/>
-              </a:ext>
-            </a:extLst>
-          </a:blip>
-          <a:stretch>
-            <a:fillRect/>
-          </a:stretch>
-        </p:blipFill>
-        <p:spPr>
-          <a:xfrm>
-            <a:off x="8744911" y="4762665"/>
-            <a:ext cx="1456440" cy="1980700"/>
-          </a:xfrm>
-          <a:prstGeom prst="rect">
-            <a:avLst/>
-          </a:prstGeom>
-        </p:spPr>
-      </p:pic>
+        </p:nvSpPr>
+        <p:spPr/>
+        <p:txBody>
+          <a:bodyPr/>
+          <a:lstStyle/>
+          <a:p>
+            <a:r>
+              <a:rPr lang="en-IE" dirty="0"/>
+              <a:t>Login – </a:t>
+            </a:r>
+            <a:r>
+              <a:rPr lang="en-IE" sz="2400" i="1" dirty="0"/>
+              <a:t>functioning login</a:t>
+            </a:r>
+          </a:p>
+          <a:p>
+            <a:r>
+              <a:rPr lang="en-IE" dirty="0"/>
+              <a:t>Modules for student – </a:t>
+            </a:r>
+            <a:r>
+              <a:rPr lang="en-IE" sz="2400" i="1" dirty="0"/>
+              <a:t>students having there own section for each of there modules</a:t>
+            </a:r>
+          </a:p>
+          <a:p>
+            <a:r>
+              <a:rPr lang="en-IE" dirty="0" err="1"/>
+              <a:t>Chatbox</a:t>
+            </a:r>
+            <a:r>
+              <a:rPr lang="en-IE" dirty="0"/>
+              <a:t> – </a:t>
+            </a:r>
+            <a:r>
+              <a:rPr lang="en-IE" sz="2400" i="1" dirty="0"/>
+              <a:t>Getting communication between users in real time</a:t>
+            </a:r>
+          </a:p>
+          <a:p>
+            <a:r>
+              <a:rPr lang="en-IE" dirty="0"/>
+              <a:t>Video- </a:t>
+            </a:r>
+            <a:r>
+              <a:rPr lang="en-IE" sz="2400" dirty="0"/>
+              <a:t>allowing users to be able to Video call one another</a:t>
+            </a:r>
+          </a:p>
+          <a:p>
+            <a:pPr marL="0" indent="0">
+              <a:buNone/>
+            </a:pPr>
+            <a:endParaRPr lang="en-IE" dirty="0"/>
+          </a:p>
+        </p:txBody>
+      </p:sp>
     </p:spTree>
     <p:extLst>
       <p:ext uri="{BB962C8B-B14F-4D97-AF65-F5344CB8AC3E}">
-        <p14:creationId xmlns:p14="http://schemas.microsoft.com/office/powerpoint/2010/main" val="147877769"/>
+        <p14:creationId xmlns:p14="http://schemas.microsoft.com/office/powerpoint/2010/main" val="1824176123"/>
       </p:ext>
     </p:extLst>
   </p:cSld>
@@ -4737,6 +3902,135 @@
 </file>
 
 <file path=ppt/slides/slide11.xml><?xml version="1.0" encoding="utf-8"?>
+<p:sld xmlns:a="http://schemas.openxmlformats.org/drawingml/2006/main" xmlns:r="http://schemas.openxmlformats.org/officeDocument/2006/relationships" xmlns:p="http://schemas.openxmlformats.org/presentationml/2006/main">
+  <p:cSld>
+    <p:spTree>
+      <p:nvGrpSpPr>
+        <p:cNvPr id="1" name=""/>
+        <p:cNvGrpSpPr/>
+        <p:nvPr/>
+      </p:nvGrpSpPr>
+      <p:grpSpPr>
+        <a:xfrm>
+          <a:off x="0" y="0"/>
+          <a:ext cx="0" cy="0"/>
+          <a:chOff x="0" y="0"/>
+          <a:chExt cx="0" cy="0"/>
+        </a:xfrm>
+      </p:grpSpPr>
+      <p:sp>
+        <p:nvSpPr>
+          <p:cNvPr id="2" name="Title 1">
+            <a:extLst>
+              <a:ext uri="{FF2B5EF4-FFF2-40B4-BE49-F238E27FC236}">
+                <a16:creationId xmlns:a16="http://schemas.microsoft.com/office/drawing/2014/main" id="{D711E9FE-88AA-44C0-8954-8C36F341A4BD}"/>
+              </a:ext>
+            </a:extLst>
+          </p:cNvPr>
+          <p:cNvSpPr>
+            <a:spLocks noGrp="1"/>
+          </p:cNvSpPr>
+          <p:nvPr>
+            <p:ph type="title"/>
+          </p:nvPr>
+        </p:nvSpPr>
+        <p:spPr/>
+        <p:txBody>
+          <a:bodyPr/>
+          <a:lstStyle/>
+          <a:p>
+            <a:r>
+              <a:rPr lang="en-US" dirty="0"/>
+              <a:t>Video and audio – Web RTC</a:t>
+            </a:r>
+          </a:p>
+        </p:txBody>
+      </p:sp>
+      <p:pic>
+        <p:nvPicPr>
+          <p:cNvPr id="5" name="Content Placeholder 4" descr="A screenshot of a person&#10;&#10;Description automatically generated">
+            <a:extLst>
+              <a:ext uri="{FF2B5EF4-FFF2-40B4-BE49-F238E27FC236}">
+                <a16:creationId xmlns:a16="http://schemas.microsoft.com/office/drawing/2014/main" id="{3F60D791-587D-4F11-8953-7A805AE55115}"/>
+              </a:ext>
+            </a:extLst>
+          </p:cNvPr>
+          <p:cNvPicPr>
+            <a:picLocks noGrp="1" noChangeAspect="1"/>
+          </p:cNvPicPr>
+          <p:nvPr>
+            <p:ph idx="1"/>
+          </p:nvPr>
+        </p:nvPicPr>
+        <p:blipFill>
+          <a:blip r:embed="rId2">
+            <a:extLst>
+              <a:ext uri="{28A0092B-C50C-407E-A947-70E740481C1C}">
+                <a14:useLocalDpi xmlns:a14="http://schemas.microsoft.com/office/drawing/2010/main" val="0"/>
+              </a:ext>
+            </a:extLst>
+          </a:blip>
+          <a:stretch>
+            <a:fillRect/>
+          </a:stretch>
+        </p:blipFill>
+        <p:spPr>
+          <a:xfrm>
+            <a:off x="455645" y="3341987"/>
+            <a:ext cx="11150081" cy="3022174"/>
+          </a:xfrm>
+        </p:spPr>
+      </p:pic>
+      <p:pic>
+        <p:nvPicPr>
+          <p:cNvPr id="7" name="Picture 6" descr="Graphical user interface, text&#10;&#10;Description automatically generated">
+            <a:extLst>
+              <a:ext uri="{FF2B5EF4-FFF2-40B4-BE49-F238E27FC236}">
+                <a16:creationId xmlns:a16="http://schemas.microsoft.com/office/drawing/2014/main" id="{7C038D34-49F0-4CD3-AF83-25CA8BFA468C}"/>
+              </a:ext>
+            </a:extLst>
+          </p:cNvPr>
+          <p:cNvPicPr>
+            <a:picLocks noChangeAspect="1"/>
+          </p:cNvPicPr>
+          <p:nvPr/>
+        </p:nvPicPr>
+        <p:blipFill>
+          <a:blip r:embed="rId3">
+            <a:extLst>
+              <a:ext uri="{28A0092B-C50C-407E-A947-70E740481C1C}">
+                <a14:useLocalDpi xmlns:a14="http://schemas.microsoft.com/office/drawing/2010/main" val="0"/>
+              </a:ext>
+            </a:extLst>
+          </a:blip>
+          <a:stretch>
+            <a:fillRect/>
+          </a:stretch>
+        </p:blipFill>
+        <p:spPr>
+          <a:xfrm>
+            <a:off x="3718919" y="1801863"/>
+            <a:ext cx="4324954" cy="1428949"/>
+          </a:xfrm>
+          <a:prstGeom prst="rect">
+            <a:avLst/>
+          </a:prstGeom>
+        </p:spPr>
+      </p:pic>
+    </p:spTree>
+    <p:extLst>
+      <p:ext uri="{BB962C8B-B14F-4D97-AF65-F5344CB8AC3E}">
+        <p14:creationId xmlns:p14="http://schemas.microsoft.com/office/powerpoint/2010/main" val="4058338168"/>
+      </p:ext>
+    </p:extLst>
+  </p:cSld>
+  <p:clrMapOvr>
+    <a:masterClrMapping/>
+  </p:clrMapOvr>
+</p:sld>
+</file>
+
+<file path=ppt/slides/slide12.xml><?xml version="1.0" encoding="utf-8"?>
 <p:sld xmlns:a="http://schemas.openxmlformats.org/drawingml/2006/main" xmlns:r="http://schemas.openxmlformats.org/officeDocument/2006/relationships" xmlns:p="http://schemas.openxmlformats.org/presentationml/2006/main">
   <p:cSld>
     <p:spTree>
@@ -6073,10 +5367,60 @@
       </p:grpSpPr>
       <p:sp>
         <p:nvSpPr>
+          <p:cNvPr id="13" name="Rectangle 12">
+            <a:extLst>
+              <a:ext uri="{FF2B5EF4-FFF2-40B4-BE49-F238E27FC236}">
+                <a16:creationId xmlns:a16="http://schemas.microsoft.com/office/drawing/2014/main" id="{8D415432-49E0-466F-A1A6-B45B23B79E2C}"/>
+              </a:ext>
+            </a:extLst>
+          </p:cNvPr>
+          <p:cNvSpPr/>
+          <p:nvPr/>
+        </p:nvSpPr>
+        <p:spPr>
+          <a:xfrm>
+            <a:off x="37454" y="1292507"/>
+            <a:ext cx="11913514" cy="2217368"/>
+          </a:xfrm>
+          <a:prstGeom prst="rect">
+            <a:avLst/>
+          </a:prstGeom>
+          <a:solidFill>
+            <a:schemeClr val="accent3"/>
+          </a:solidFill>
+          <a:ln>
+            <a:noFill/>
+          </a:ln>
+        </p:spPr>
+        <p:style>
+          <a:lnRef idx="0">
+            <a:scrgbClr r="0" g="0" b="0"/>
+          </a:lnRef>
+          <a:fillRef idx="0">
+            <a:scrgbClr r="0" g="0" b="0"/>
+          </a:fillRef>
+          <a:effectRef idx="0">
+            <a:scrgbClr r="0" g="0" b="0"/>
+          </a:effectRef>
+          <a:fontRef idx="minor">
+            <a:schemeClr val="lt1"/>
+          </a:fontRef>
+        </p:style>
+        <p:txBody>
+          <a:bodyPr rtlCol="0" anchor="ctr"/>
+          <a:lstStyle/>
+          <a:p>
+            <a:pPr algn="ctr"/>
+            <a:endParaRPr lang="en-GB"/>
+          </a:p>
+        </p:txBody>
+      </p:sp>
+      <p:sp>
+        <p:nvSpPr>
           <p:cNvPr id="2" name="Title 1">
             <a:extLst>
               <a:ext uri="{FF2B5EF4-FFF2-40B4-BE49-F238E27FC236}">
-                <a16:creationId xmlns:a16="http://schemas.microsoft.com/office/drawing/2014/main" id="{6EF75AAA-22C8-471F-949E-26A1C6B6AC9D}"/>
+                <a16:creationId xmlns:a16="http://schemas.microsoft.com/office/drawing/2014/main" id="{B70B6794-6443-40C1-BF14-DF19F2A8526E}"/>
               </a:ext>
             </a:extLst>
           </p:cNvPr>
@@ -6087,94 +5431,881 @@
             <p:ph type="title"/>
           </p:nvPr>
         </p:nvSpPr>
-        <p:spPr/>
+        <p:spPr>
+          <a:xfrm>
+            <a:off x="0" y="0"/>
+            <a:ext cx="3547108" cy="958163"/>
+          </a:xfrm>
+        </p:spPr>
         <p:txBody>
           <a:bodyPr/>
           <a:lstStyle/>
           <a:p>
             <a:r>
               <a:rPr lang="en-IE" dirty="0"/>
-              <a:t>Plan for semester 2 </a:t>
-            </a:r>
-          </a:p>
-        </p:txBody>
-      </p:sp>
-      <p:sp>
-        <p:nvSpPr>
-          <p:cNvPr id="3" name="Content Placeholder 2">
-            <a:extLst>
-              <a:ext uri="{FF2B5EF4-FFF2-40B4-BE49-F238E27FC236}">
-                <a16:creationId xmlns:a16="http://schemas.microsoft.com/office/drawing/2014/main" id="{538E5270-E050-4D66-A739-B963C0744FBB}"/>
-              </a:ext>
-            </a:extLst>
-          </p:cNvPr>
-          <p:cNvSpPr>
-            <a:spLocks noGrp="1"/>
-          </p:cNvSpPr>
+              <a:t>Website Pages</a:t>
+            </a:r>
+            <a:endParaRPr lang="en-IE" sz="1600" u="sng" dirty="0">
+              <a:solidFill>
+                <a:srgbClr val="FF0000"/>
+              </a:solidFill>
+            </a:endParaRPr>
+          </a:p>
+        </p:txBody>
+      </p:sp>
+      <p:pic>
+        <p:nvPicPr>
+          <p:cNvPr id="4" name="Picture 3">
+            <a:extLst>
+              <a:ext uri="{FF2B5EF4-FFF2-40B4-BE49-F238E27FC236}">
+                <a16:creationId xmlns:a16="http://schemas.microsoft.com/office/drawing/2014/main" id="{18FF8AF0-A639-4250-9BEC-BB98FC4B890D}"/>
+              </a:ext>
+            </a:extLst>
+          </p:cNvPr>
+          <p:cNvPicPr>
+            <a:picLocks noChangeAspect="1"/>
+          </p:cNvPicPr>
+          <p:nvPr/>
+        </p:nvPicPr>
+        <p:blipFill>
+          <a:blip r:embed="rId2"/>
+          <a:stretch>
+            <a:fillRect/>
+          </a:stretch>
+        </p:blipFill>
+        <p:spPr>
+          <a:xfrm>
+            <a:off x="5487350" y="1688870"/>
+            <a:ext cx="2639878" cy="1607601"/>
+          </a:xfrm>
+          <a:prstGeom prst="rect">
+            <a:avLst/>
+          </a:prstGeom>
+        </p:spPr>
+      </p:pic>
+      <p:pic>
+        <p:nvPicPr>
+          <p:cNvPr id="5" name="Content Placeholder 4">
+            <a:extLst>
+              <a:ext uri="{FF2B5EF4-FFF2-40B4-BE49-F238E27FC236}">
+                <a16:creationId xmlns:a16="http://schemas.microsoft.com/office/drawing/2014/main" id="{40B284E9-9B91-41F7-852F-EB9FFCD946C0}"/>
+              </a:ext>
+            </a:extLst>
+          </p:cNvPr>
+          <p:cNvPicPr>
+            <a:picLocks noGrp="1" noChangeAspect="1"/>
+          </p:cNvPicPr>
           <p:nvPr>
             <p:ph idx="1"/>
           </p:nvPr>
-        </p:nvSpPr>
-        <p:spPr/>
-        <p:txBody>
-          <a:bodyPr/>
-          <a:lstStyle/>
-          <a:p>
-            <a:r>
-              <a:rPr lang="en-IE" dirty="0"/>
-              <a:t>Login – </a:t>
-            </a:r>
-            <a:r>
-              <a:rPr lang="en-IE" sz="2400" i="1" dirty="0"/>
-              <a:t>functioning login</a:t>
-            </a:r>
-          </a:p>
-          <a:p>
-            <a:r>
-              <a:rPr lang="en-IE" dirty="0"/>
-              <a:t>Modules for student – </a:t>
-            </a:r>
-            <a:r>
-              <a:rPr lang="en-IE" sz="2400" i="1" dirty="0"/>
-              <a:t>students having there own section for each of there modules</a:t>
-            </a:r>
-          </a:p>
-          <a:p>
-            <a:r>
-              <a:rPr lang="en-IE" dirty="0" err="1"/>
-              <a:t>Chatbox</a:t>
-            </a:r>
-            <a:r>
-              <a:rPr lang="en-IE" dirty="0"/>
-              <a:t> – </a:t>
-            </a:r>
-            <a:r>
-              <a:rPr lang="en-IE" sz="2400" i="1" dirty="0"/>
-              <a:t>Getting communication between users in real time</a:t>
-            </a:r>
-          </a:p>
-          <a:p>
-            <a:r>
-              <a:rPr lang="en-IE" dirty="0"/>
-              <a:t>Video- </a:t>
-            </a:r>
-            <a:r>
-              <a:rPr lang="en-IE" sz="2400" dirty="0"/>
-              <a:t>allowing users to be able to Video call one another</a:t>
-            </a:r>
-          </a:p>
-          <a:p>
-            <a:pPr marL="0" indent="0">
-              <a:buNone/>
-            </a:pPr>
-            <a:endParaRPr lang="en-IE" dirty="0"/>
-          </a:p>
-        </p:txBody>
-      </p:sp>
+        </p:nvPicPr>
+        <p:blipFill>
+          <a:blip r:embed="rId3"/>
+          <a:stretch>
+            <a:fillRect/>
+          </a:stretch>
+        </p:blipFill>
+        <p:spPr>
+          <a:xfrm>
+            <a:off x="9201621" y="1614499"/>
+            <a:ext cx="2399801" cy="1691032"/>
+          </a:xfrm>
+          <a:prstGeom prst="rect">
+            <a:avLst/>
+          </a:prstGeom>
+        </p:spPr>
+      </p:pic>
+      <p:sp>
+        <p:nvSpPr>
+          <p:cNvPr id="6" name="TextBox 5">
+            <a:extLst>
+              <a:ext uri="{FF2B5EF4-FFF2-40B4-BE49-F238E27FC236}">
+                <a16:creationId xmlns:a16="http://schemas.microsoft.com/office/drawing/2014/main" id="{D73F94B1-3ED6-42A0-A0B1-4EB88607CF5D}"/>
+              </a:ext>
+            </a:extLst>
+          </p:cNvPr>
+          <p:cNvSpPr txBox="1"/>
+          <p:nvPr/>
+        </p:nvSpPr>
+        <p:spPr>
+          <a:xfrm>
+            <a:off x="5871049" y="1246224"/>
+            <a:ext cx="2203770" cy="369332"/>
+          </a:xfrm>
+          <a:prstGeom prst="rect">
+            <a:avLst/>
+          </a:prstGeom>
+          <a:noFill/>
+        </p:spPr>
+        <p:txBody>
+          <a:bodyPr wrap="square" rtlCol="0">
+            <a:spAutoFit/>
+          </a:bodyPr>
+          <a:lstStyle/>
+          <a:p>
+            <a:r>
+              <a:rPr lang="en-GB" dirty="0"/>
+              <a:t>Calendar Page</a:t>
+            </a:r>
+          </a:p>
+        </p:txBody>
+      </p:sp>
+      <p:sp>
+        <p:nvSpPr>
+          <p:cNvPr id="7" name="TextBox 6">
+            <a:extLst>
+              <a:ext uri="{FF2B5EF4-FFF2-40B4-BE49-F238E27FC236}">
+                <a16:creationId xmlns:a16="http://schemas.microsoft.com/office/drawing/2014/main" id="{5D8FCDBB-782B-44AD-876A-ACD78649C362}"/>
+              </a:ext>
+            </a:extLst>
+          </p:cNvPr>
+          <p:cNvSpPr txBox="1"/>
+          <p:nvPr/>
+        </p:nvSpPr>
+        <p:spPr>
+          <a:xfrm>
+            <a:off x="9593949" y="1243881"/>
+            <a:ext cx="2455942" cy="369332"/>
+          </a:xfrm>
+          <a:prstGeom prst="rect">
+            <a:avLst/>
+          </a:prstGeom>
+          <a:noFill/>
+        </p:spPr>
+        <p:txBody>
+          <a:bodyPr wrap="square" rtlCol="0">
+            <a:spAutoFit/>
+          </a:bodyPr>
+          <a:lstStyle/>
+          <a:p>
+            <a:r>
+              <a:rPr lang="en-GB" dirty="0"/>
+              <a:t>Help /Contact Page</a:t>
+            </a:r>
+          </a:p>
+        </p:txBody>
+      </p:sp>
+      <p:pic>
+        <p:nvPicPr>
+          <p:cNvPr id="8" name="Picture 7">
+            <a:extLst>
+              <a:ext uri="{FF2B5EF4-FFF2-40B4-BE49-F238E27FC236}">
+                <a16:creationId xmlns:a16="http://schemas.microsoft.com/office/drawing/2014/main" id="{3675D92F-2215-4F04-8682-3F2A3AA2D4AF}"/>
+              </a:ext>
+            </a:extLst>
+          </p:cNvPr>
+          <p:cNvPicPr>
+            <a:picLocks noChangeAspect="1"/>
+          </p:cNvPicPr>
+          <p:nvPr/>
+        </p:nvPicPr>
+        <p:blipFill>
+          <a:blip r:embed="rId4"/>
+          <a:stretch>
+            <a:fillRect/>
+          </a:stretch>
+        </p:blipFill>
+        <p:spPr>
+          <a:xfrm>
+            <a:off x="2378341" y="1688870"/>
+            <a:ext cx="2696449" cy="1607601"/>
+          </a:xfrm>
+          <a:prstGeom prst="rect">
+            <a:avLst/>
+          </a:prstGeom>
+        </p:spPr>
+      </p:pic>
+      <p:sp>
+        <p:nvSpPr>
+          <p:cNvPr id="9" name="TextBox 8">
+            <a:extLst>
+              <a:ext uri="{FF2B5EF4-FFF2-40B4-BE49-F238E27FC236}">
+                <a16:creationId xmlns:a16="http://schemas.microsoft.com/office/drawing/2014/main" id="{5458793E-EABD-44DE-AF53-0820ECD3D6FE}"/>
+              </a:ext>
+            </a:extLst>
+          </p:cNvPr>
+          <p:cNvSpPr txBox="1"/>
+          <p:nvPr/>
+        </p:nvSpPr>
+        <p:spPr>
+          <a:xfrm>
+            <a:off x="307422" y="1241752"/>
+            <a:ext cx="1533305" cy="369332"/>
+          </a:xfrm>
+          <a:prstGeom prst="rect">
+            <a:avLst/>
+          </a:prstGeom>
+          <a:noFill/>
+        </p:spPr>
+        <p:txBody>
+          <a:bodyPr wrap="none" rtlCol="0">
+            <a:spAutoFit/>
+          </a:bodyPr>
+          <a:lstStyle/>
+          <a:p>
+            <a:r>
+              <a:rPr lang="en-GB" dirty="0"/>
+              <a:t>Login/Register</a:t>
+            </a:r>
+          </a:p>
+        </p:txBody>
+      </p:sp>
+      <p:sp>
+        <p:nvSpPr>
+          <p:cNvPr id="10" name="TextBox 9">
+            <a:extLst>
+              <a:ext uri="{FF2B5EF4-FFF2-40B4-BE49-F238E27FC236}">
+                <a16:creationId xmlns:a16="http://schemas.microsoft.com/office/drawing/2014/main" id="{52D9E75F-BAF6-4789-908B-73AE07CC9145}"/>
+              </a:ext>
+            </a:extLst>
+          </p:cNvPr>
+          <p:cNvSpPr txBox="1"/>
+          <p:nvPr/>
+        </p:nvSpPr>
+        <p:spPr>
+          <a:xfrm>
+            <a:off x="3547108" y="1247099"/>
+            <a:ext cx="1348575" cy="369332"/>
+          </a:xfrm>
+          <a:prstGeom prst="rect">
+            <a:avLst/>
+          </a:prstGeom>
+          <a:noFill/>
+        </p:spPr>
+        <p:txBody>
+          <a:bodyPr wrap="square" rtlCol="0">
+            <a:spAutoFit/>
+          </a:bodyPr>
+          <a:lstStyle/>
+          <a:p>
+            <a:r>
+              <a:rPr lang="en-GB" dirty="0"/>
+              <a:t>Home</a:t>
+            </a:r>
+          </a:p>
+        </p:txBody>
+      </p:sp>
+      <p:pic>
+        <p:nvPicPr>
+          <p:cNvPr id="11" name="Picture 10">
+            <a:extLst>
+              <a:ext uri="{FF2B5EF4-FFF2-40B4-BE49-F238E27FC236}">
+                <a16:creationId xmlns:a16="http://schemas.microsoft.com/office/drawing/2014/main" id="{45A28888-827B-4D8A-9817-DD17A9AFA92A}"/>
+              </a:ext>
+            </a:extLst>
+          </p:cNvPr>
+          <p:cNvPicPr>
+            <a:picLocks noChangeAspect="1"/>
+          </p:cNvPicPr>
+          <p:nvPr/>
+        </p:nvPicPr>
+        <p:blipFill>
+          <a:blip r:embed="rId5"/>
+          <a:stretch>
+            <a:fillRect/>
+          </a:stretch>
+        </p:blipFill>
+        <p:spPr>
+          <a:xfrm>
+            <a:off x="273310" y="1562655"/>
+            <a:ext cx="1692469" cy="892033"/>
+          </a:xfrm>
+          <a:prstGeom prst="rect">
+            <a:avLst/>
+          </a:prstGeom>
+        </p:spPr>
+      </p:pic>
+      <p:pic>
+        <p:nvPicPr>
+          <p:cNvPr id="12" name="Picture 11">
+            <a:extLst>
+              <a:ext uri="{FF2B5EF4-FFF2-40B4-BE49-F238E27FC236}">
+                <a16:creationId xmlns:a16="http://schemas.microsoft.com/office/drawing/2014/main" id="{19874CAE-D900-4998-B35D-5F2D8C82EF43}"/>
+              </a:ext>
+            </a:extLst>
+          </p:cNvPr>
+          <p:cNvPicPr>
+            <a:picLocks noChangeAspect="1"/>
+          </p:cNvPicPr>
+          <p:nvPr/>
+        </p:nvPicPr>
+        <p:blipFill>
+          <a:blip r:embed="rId6"/>
+          <a:stretch>
+            <a:fillRect/>
+          </a:stretch>
+        </p:blipFill>
+        <p:spPr>
+          <a:xfrm>
+            <a:off x="273311" y="2488243"/>
+            <a:ext cx="1692470" cy="969149"/>
+          </a:xfrm>
+          <a:prstGeom prst="rect">
+            <a:avLst/>
+          </a:prstGeom>
+        </p:spPr>
+      </p:pic>
+      <p:sp>
+        <p:nvSpPr>
+          <p:cNvPr id="14" name="Rectangle 13">
+            <a:extLst>
+              <a:ext uri="{FF2B5EF4-FFF2-40B4-BE49-F238E27FC236}">
+                <a16:creationId xmlns:a16="http://schemas.microsoft.com/office/drawing/2014/main" id="{C043984E-48A5-4E76-84F5-EB1FB94B80EF}"/>
+              </a:ext>
+            </a:extLst>
+          </p:cNvPr>
+          <p:cNvSpPr/>
+          <p:nvPr/>
+        </p:nvSpPr>
+        <p:spPr>
+          <a:xfrm>
+            <a:off x="34815" y="4592671"/>
+            <a:ext cx="11913514" cy="2217368"/>
+          </a:xfrm>
+          <a:prstGeom prst="rect">
+            <a:avLst/>
+          </a:prstGeom>
+          <a:solidFill>
+            <a:schemeClr val="accent3"/>
+          </a:solidFill>
+          <a:ln>
+            <a:noFill/>
+          </a:ln>
+        </p:spPr>
+        <p:style>
+          <a:lnRef idx="0">
+            <a:scrgbClr r="0" g="0" b="0"/>
+          </a:lnRef>
+          <a:fillRef idx="0">
+            <a:scrgbClr r="0" g="0" b="0"/>
+          </a:fillRef>
+          <a:effectRef idx="0">
+            <a:scrgbClr r="0" g="0" b="0"/>
+          </a:effectRef>
+          <a:fontRef idx="minor">
+            <a:schemeClr val="lt1"/>
+          </a:fontRef>
+        </p:style>
+        <p:txBody>
+          <a:bodyPr rtlCol="0" anchor="ctr"/>
+          <a:lstStyle/>
+          <a:p>
+            <a:pPr algn="ctr"/>
+            <a:endParaRPr lang="en-GB"/>
+          </a:p>
+        </p:txBody>
+      </p:sp>
+      <p:pic>
+        <p:nvPicPr>
+          <p:cNvPr id="15" name="Picture 14">
+            <a:extLst>
+              <a:ext uri="{FF2B5EF4-FFF2-40B4-BE49-F238E27FC236}">
+                <a16:creationId xmlns:a16="http://schemas.microsoft.com/office/drawing/2014/main" id="{769094B3-9760-4884-822F-F5BB466F09A7}"/>
+              </a:ext>
+            </a:extLst>
+          </p:cNvPr>
+          <p:cNvPicPr>
+            <a:picLocks noChangeAspect="1"/>
+          </p:cNvPicPr>
+          <p:nvPr/>
+        </p:nvPicPr>
+        <p:blipFill>
+          <a:blip r:embed="rId7"/>
+          <a:stretch>
+            <a:fillRect/>
+          </a:stretch>
+        </p:blipFill>
+        <p:spPr>
+          <a:xfrm>
+            <a:off x="4804728" y="4832532"/>
+            <a:ext cx="1505092" cy="1209069"/>
+          </a:xfrm>
+          <a:prstGeom prst="rect">
+            <a:avLst/>
+          </a:prstGeom>
+        </p:spPr>
+      </p:pic>
+      <p:sp>
+        <p:nvSpPr>
+          <p:cNvPr id="16" name="TextBox 15">
+            <a:extLst>
+              <a:ext uri="{FF2B5EF4-FFF2-40B4-BE49-F238E27FC236}">
+                <a16:creationId xmlns:a16="http://schemas.microsoft.com/office/drawing/2014/main" id="{F14AFBBE-3EA4-4270-B210-F335F0E3FB7D}"/>
+              </a:ext>
+            </a:extLst>
+          </p:cNvPr>
+          <p:cNvSpPr txBox="1"/>
+          <p:nvPr/>
+        </p:nvSpPr>
+        <p:spPr>
+          <a:xfrm>
+            <a:off x="4847348" y="4236176"/>
+            <a:ext cx="1505092" cy="369332"/>
+          </a:xfrm>
+          <a:prstGeom prst="rect">
+            <a:avLst/>
+          </a:prstGeom>
+          <a:noFill/>
+        </p:spPr>
+        <p:txBody>
+          <a:bodyPr wrap="none" rtlCol="0">
+            <a:spAutoFit/>
+          </a:bodyPr>
+          <a:lstStyle/>
+          <a:p>
+            <a:r>
+              <a:rPr lang="en-GB" dirty="0"/>
+              <a:t>Modules Page</a:t>
+            </a:r>
+          </a:p>
+        </p:txBody>
+      </p:sp>
+      <p:sp>
+        <p:nvSpPr>
+          <p:cNvPr id="18" name="TextBox 17">
+            <a:extLst>
+              <a:ext uri="{FF2B5EF4-FFF2-40B4-BE49-F238E27FC236}">
+                <a16:creationId xmlns:a16="http://schemas.microsoft.com/office/drawing/2014/main" id="{68FCF61C-3FD0-4375-822B-BD1C5C05124A}"/>
+              </a:ext>
+            </a:extLst>
+          </p:cNvPr>
+          <p:cNvSpPr txBox="1"/>
+          <p:nvPr/>
+        </p:nvSpPr>
+        <p:spPr>
+          <a:xfrm>
+            <a:off x="10244735" y="4217395"/>
+            <a:ext cx="1947265" cy="369332"/>
+          </a:xfrm>
+          <a:prstGeom prst="rect">
+            <a:avLst/>
+          </a:prstGeom>
+          <a:noFill/>
+        </p:spPr>
+        <p:txBody>
+          <a:bodyPr wrap="square" rtlCol="0">
+            <a:spAutoFit/>
+          </a:bodyPr>
+          <a:lstStyle/>
+          <a:p>
+            <a:r>
+              <a:rPr lang="en-GB" dirty="0"/>
+              <a:t>Help/Contact Page</a:t>
+            </a:r>
+          </a:p>
+        </p:txBody>
+      </p:sp>
+      <p:pic>
+        <p:nvPicPr>
+          <p:cNvPr id="20" name="Picture 19">
+            <a:extLst>
+              <a:ext uri="{FF2B5EF4-FFF2-40B4-BE49-F238E27FC236}">
+                <a16:creationId xmlns:a16="http://schemas.microsoft.com/office/drawing/2014/main" id="{6B30807D-BE55-4824-AB33-D1BD5814753C}"/>
+              </a:ext>
+            </a:extLst>
+          </p:cNvPr>
+          <p:cNvPicPr>
+            <a:picLocks noChangeAspect="1"/>
+          </p:cNvPicPr>
+          <p:nvPr/>
+        </p:nvPicPr>
+        <p:blipFill>
+          <a:blip r:embed="rId8"/>
+          <a:stretch>
+            <a:fillRect/>
+          </a:stretch>
+        </p:blipFill>
+        <p:spPr>
+          <a:xfrm>
+            <a:off x="10501392" y="4821589"/>
+            <a:ext cx="1289236" cy="1695694"/>
+          </a:xfrm>
+          <a:prstGeom prst="rect">
+            <a:avLst/>
+          </a:prstGeom>
+        </p:spPr>
+      </p:pic>
+      <p:pic>
+        <p:nvPicPr>
+          <p:cNvPr id="21" name="Picture 20">
+            <a:extLst>
+              <a:ext uri="{FF2B5EF4-FFF2-40B4-BE49-F238E27FC236}">
+                <a16:creationId xmlns:a16="http://schemas.microsoft.com/office/drawing/2014/main" id="{AC2EF7F8-4275-43F4-B02B-24CC0F19A081}"/>
+              </a:ext>
+            </a:extLst>
+          </p:cNvPr>
+          <p:cNvPicPr>
+            <a:picLocks noChangeAspect="1"/>
+          </p:cNvPicPr>
+          <p:nvPr/>
+        </p:nvPicPr>
+        <p:blipFill>
+          <a:blip r:embed="rId9"/>
+          <a:stretch>
+            <a:fillRect/>
+          </a:stretch>
+        </p:blipFill>
+        <p:spPr>
+          <a:xfrm>
+            <a:off x="6559888" y="4820239"/>
+            <a:ext cx="1934955" cy="1209069"/>
+          </a:xfrm>
+          <a:prstGeom prst="rect">
+            <a:avLst/>
+          </a:prstGeom>
+        </p:spPr>
+      </p:pic>
+      <p:sp>
+        <p:nvSpPr>
+          <p:cNvPr id="22" name="TextBox 21">
+            <a:extLst>
+              <a:ext uri="{FF2B5EF4-FFF2-40B4-BE49-F238E27FC236}">
+                <a16:creationId xmlns:a16="http://schemas.microsoft.com/office/drawing/2014/main" id="{65F84F53-6F54-4804-9419-B75C9DC0A1AE}"/>
+              </a:ext>
+            </a:extLst>
+          </p:cNvPr>
+          <p:cNvSpPr txBox="1"/>
+          <p:nvPr/>
+        </p:nvSpPr>
+        <p:spPr>
+          <a:xfrm>
+            <a:off x="6807289" y="4236176"/>
+            <a:ext cx="2241834" cy="369332"/>
+          </a:xfrm>
+          <a:prstGeom prst="rect">
+            <a:avLst/>
+          </a:prstGeom>
+          <a:noFill/>
+        </p:spPr>
+        <p:txBody>
+          <a:bodyPr wrap="square" rtlCol="0">
+            <a:spAutoFit/>
+          </a:bodyPr>
+          <a:lstStyle/>
+          <a:p>
+            <a:r>
+              <a:rPr lang="en-GB" dirty="0"/>
+              <a:t>Calendar Page</a:t>
+            </a:r>
+          </a:p>
+        </p:txBody>
+      </p:sp>
+      <p:pic>
+        <p:nvPicPr>
+          <p:cNvPr id="23" name="Picture 22">
+            <a:extLst>
+              <a:ext uri="{FF2B5EF4-FFF2-40B4-BE49-F238E27FC236}">
+                <a16:creationId xmlns:a16="http://schemas.microsoft.com/office/drawing/2014/main" id="{DADB0D1F-5983-4A05-85DD-C7D0765A0BDF}"/>
+              </a:ext>
+            </a:extLst>
+          </p:cNvPr>
+          <p:cNvPicPr>
+            <a:picLocks noChangeAspect="1"/>
+          </p:cNvPicPr>
+          <p:nvPr/>
+        </p:nvPicPr>
+        <p:blipFill>
+          <a:blip r:embed="rId6"/>
+          <a:stretch>
+            <a:fillRect/>
+          </a:stretch>
+        </p:blipFill>
+        <p:spPr>
+          <a:xfrm>
+            <a:off x="140777" y="5686823"/>
+            <a:ext cx="1655055" cy="1047924"/>
+          </a:xfrm>
+          <a:prstGeom prst="rect">
+            <a:avLst/>
+          </a:prstGeom>
+        </p:spPr>
+      </p:pic>
+      <p:pic>
+        <p:nvPicPr>
+          <p:cNvPr id="24" name="Picture 23">
+            <a:extLst>
+              <a:ext uri="{FF2B5EF4-FFF2-40B4-BE49-F238E27FC236}">
+                <a16:creationId xmlns:a16="http://schemas.microsoft.com/office/drawing/2014/main" id="{B4F65875-81C7-4B53-9BDC-980EF8609E01}"/>
+              </a:ext>
+            </a:extLst>
+          </p:cNvPr>
+          <p:cNvPicPr>
+            <a:picLocks noChangeAspect="1"/>
+          </p:cNvPicPr>
+          <p:nvPr/>
+        </p:nvPicPr>
+        <p:blipFill>
+          <a:blip r:embed="rId5"/>
+          <a:stretch>
+            <a:fillRect/>
+          </a:stretch>
+        </p:blipFill>
+        <p:spPr>
+          <a:xfrm>
+            <a:off x="140777" y="4628070"/>
+            <a:ext cx="1655054" cy="988178"/>
+          </a:xfrm>
+          <a:prstGeom prst="rect">
+            <a:avLst/>
+          </a:prstGeom>
+        </p:spPr>
+      </p:pic>
+      <p:pic>
+        <p:nvPicPr>
+          <p:cNvPr id="25" name="Picture 24">
+            <a:extLst>
+              <a:ext uri="{FF2B5EF4-FFF2-40B4-BE49-F238E27FC236}">
+                <a16:creationId xmlns:a16="http://schemas.microsoft.com/office/drawing/2014/main" id="{E687B923-713F-4C1C-9FE8-D9E317D40D5E}"/>
+              </a:ext>
+            </a:extLst>
+          </p:cNvPr>
+          <p:cNvPicPr>
+            <a:picLocks noChangeAspect="1"/>
+          </p:cNvPicPr>
+          <p:nvPr/>
+        </p:nvPicPr>
+        <p:blipFill>
+          <a:blip r:embed="rId4"/>
+          <a:stretch>
+            <a:fillRect/>
+          </a:stretch>
+        </p:blipFill>
+        <p:spPr>
+          <a:xfrm>
+            <a:off x="2079624" y="4719461"/>
+            <a:ext cx="2473715" cy="1525829"/>
+          </a:xfrm>
+          <a:prstGeom prst="rect">
+            <a:avLst/>
+          </a:prstGeom>
+        </p:spPr>
+      </p:pic>
+      <p:sp>
+        <p:nvSpPr>
+          <p:cNvPr id="26" name="TextBox 25">
+            <a:extLst>
+              <a:ext uri="{FF2B5EF4-FFF2-40B4-BE49-F238E27FC236}">
+                <a16:creationId xmlns:a16="http://schemas.microsoft.com/office/drawing/2014/main" id="{0B15152D-0C05-4490-A539-00F176DD059C}"/>
+              </a:ext>
+            </a:extLst>
+          </p:cNvPr>
+          <p:cNvSpPr txBox="1"/>
+          <p:nvPr/>
+        </p:nvSpPr>
+        <p:spPr>
+          <a:xfrm>
+            <a:off x="2974019" y="4205402"/>
+            <a:ext cx="1505092" cy="369332"/>
+          </a:xfrm>
+          <a:prstGeom prst="rect">
+            <a:avLst/>
+          </a:prstGeom>
+          <a:noFill/>
+        </p:spPr>
+        <p:txBody>
+          <a:bodyPr wrap="square" rtlCol="0">
+            <a:spAutoFit/>
+          </a:bodyPr>
+          <a:lstStyle/>
+          <a:p>
+            <a:r>
+              <a:rPr lang="en-GB" dirty="0"/>
+              <a:t>Home </a:t>
+            </a:r>
+          </a:p>
+        </p:txBody>
+      </p:sp>
+      <p:sp>
+        <p:nvSpPr>
+          <p:cNvPr id="27" name="TextBox 26">
+            <a:extLst>
+              <a:ext uri="{FF2B5EF4-FFF2-40B4-BE49-F238E27FC236}">
+                <a16:creationId xmlns:a16="http://schemas.microsoft.com/office/drawing/2014/main" id="{5563A8C0-822F-41B2-9FCF-B5E9F855CDC6}"/>
+              </a:ext>
+            </a:extLst>
+          </p:cNvPr>
+          <p:cNvSpPr txBox="1"/>
+          <p:nvPr/>
+        </p:nvSpPr>
+        <p:spPr>
+          <a:xfrm>
+            <a:off x="220359" y="4240030"/>
+            <a:ext cx="1612888" cy="646331"/>
+          </a:xfrm>
+          <a:prstGeom prst="rect">
+            <a:avLst/>
+          </a:prstGeom>
+          <a:noFill/>
+        </p:spPr>
+        <p:txBody>
+          <a:bodyPr wrap="square" rtlCol="0">
+            <a:spAutoFit/>
+          </a:bodyPr>
+          <a:lstStyle/>
+          <a:p>
+            <a:r>
+              <a:rPr lang="en-GB" dirty="0"/>
+              <a:t>Login/Register</a:t>
+            </a:r>
+          </a:p>
+          <a:p>
+            <a:endParaRPr lang="en-GB" dirty="0"/>
+          </a:p>
+        </p:txBody>
+      </p:sp>
+      <p:sp>
+        <p:nvSpPr>
+          <p:cNvPr id="29" name="TextBox 28">
+            <a:extLst>
+              <a:ext uri="{FF2B5EF4-FFF2-40B4-BE49-F238E27FC236}">
+                <a16:creationId xmlns:a16="http://schemas.microsoft.com/office/drawing/2014/main" id="{5F6803EA-7FDA-4359-B674-60320562AC9C}"/>
+              </a:ext>
+            </a:extLst>
+          </p:cNvPr>
+          <p:cNvSpPr txBox="1"/>
+          <p:nvPr/>
+        </p:nvSpPr>
+        <p:spPr>
+          <a:xfrm>
+            <a:off x="5871049" y="803578"/>
+            <a:ext cx="1955900" cy="369332"/>
+          </a:xfrm>
+          <a:prstGeom prst="rect">
+            <a:avLst/>
+          </a:prstGeom>
+          <a:noFill/>
+        </p:spPr>
+        <p:txBody>
+          <a:bodyPr wrap="square" rtlCol="0">
+            <a:spAutoFit/>
+          </a:bodyPr>
+          <a:lstStyle/>
+          <a:p>
+            <a:r>
+              <a:rPr lang="en-GB" b="1" u="sng" dirty="0">
+                <a:solidFill>
+                  <a:srgbClr val="FF0000"/>
+                </a:solidFill>
+              </a:rPr>
+              <a:t>NOW</a:t>
+            </a:r>
+          </a:p>
+        </p:txBody>
+      </p:sp>
+      <p:sp>
+        <p:nvSpPr>
+          <p:cNvPr id="30" name="TextBox 29">
+            <a:extLst>
+              <a:ext uri="{FF2B5EF4-FFF2-40B4-BE49-F238E27FC236}">
+                <a16:creationId xmlns:a16="http://schemas.microsoft.com/office/drawing/2014/main" id="{EC8B66C2-B9C1-4B9E-B890-ED761B161778}"/>
+              </a:ext>
+            </a:extLst>
+          </p:cNvPr>
+          <p:cNvSpPr txBox="1"/>
+          <p:nvPr/>
+        </p:nvSpPr>
+        <p:spPr>
+          <a:xfrm>
+            <a:off x="5948952" y="3754786"/>
+            <a:ext cx="721736" cy="369332"/>
+          </a:xfrm>
+          <a:prstGeom prst="rect">
+            <a:avLst/>
+          </a:prstGeom>
+          <a:noFill/>
+        </p:spPr>
+        <p:txBody>
+          <a:bodyPr wrap="none" rtlCol="0">
+            <a:spAutoFit/>
+          </a:bodyPr>
+          <a:lstStyle/>
+          <a:p>
+            <a:r>
+              <a:rPr lang="en-GB" b="1" u="sng" dirty="0">
+                <a:solidFill>
+                  <a:srgbClr val="FF0000"/>
+                </a:solidFill>
+              </a:rPr>
+              <a:t>GOAL</a:t>
+            </a:r>
+          </a:p>
+        </p:txBody>
+      </p:sp>
+      <p:sp>
+        <p:nvSpPr>
+          <p:cNvPr id="31" name="TextBox 30">
+            <a:extLst>
+              <a:ext uri="{FF2B5EF4-FFF2-40B4-BE49-F238E27FC236}">
+                <a16:creationId xmlns:a16="http://schemas.microsoft.com/office/drawing/2014/main" id="{DA3859E4-BC13-48F0-B5AF-BF342985E81A}"/>
+              </a:ext>
+            </a:extLst>
+          </p:cNvPr>
+          <p:cNvSpPr txBox="1"/>
+          <p:nvPr/>
+        </p:nvSpPr>
+        <p:spPr>
+          <a:xfrm>
+            <a:off x="8915924" y="4214371"/>
+            <a:ext cx="1356049" cy="369332"/>
+          </a:xfrm>
+          <a:prstGeom prst="rect">
+            <a:avLst/>
+          </a:prstGeom>
+          <a:noFill/>
+        </p:spPr>
+        <p:txBody>
+          <a:bodyPr wrap="square" rtlCol="0">
+            <a:spAutoFit/>
+          </a:bodyPr>
+          <a:lstStyle/>
+          <a:p>
+            <a:r>
+              <a:rPr lang="en-GB" dirty="0"/>
+              <a:t>Chat Page</a:t>
+            </a:r>
+          </a:p>
+        </p:txBody>
+      </p:sp>
+      <p:pic>
+        <p:nvPicPr>
+          <p:cNvPr id="34" name="Picture 33" descr="Graphical user interface, text&#10;&#10;Description automatically generated">
+            <a:extLst>
+              <a:ext uri="{FF2B5EF4-FFF2-40B4-BE49-F238E27FC236}">
+                <a16:creationId xmlns:a16="http://schemas.microsoft.com/office/drawing/2014/main" id="{9BC0AA63-586F-4E57-B83B-A4DFD9248840}"/>
+              </a:ext>
+            </a:extLst>
+          </p:cNvPr>
+          <p:cNvPicPr>
+            <a:picLocks noChangeAspect="1"/>
+          </p:cNvPicPr>
+          <p:nvPr/>
+        </p:nvPicPr>
+        <p:blipFill>
+          <a:blip r:embed="rId10">
+            <a:extLst>
+              <a:ext uri="{28A0092B-C50C-407E-A947-70E740481C1C}">
+                <a14:useLocalDpi xmlns:a14="http://schemas.microsoft.com/office/drawing/2010/main" val="0"/>
+              </a:ext>
+            </a:extLst>
+          </a:blip>
+          <a:stretch>
+            <a:fillRect/>
+          </a:stretch>
+        </p:blipFill>
+        <p:spPr>
+          <a:xfrm>
+            <a:off x="8744911" y="4762665"/>
+            <a:ext cx="1456440" cy="1980700"/>
+          </a:xfrm>
+          <a:prstGeom prst="rect">
+            <a:avLst/>
+          </a:prstGeom>
+        </p:spPr>
+      </p:pic>
     </p:spTree>
     <p:extLst>
       <p:ext uri="{BB962C8B-B14F-4D97-AF65-F5344CB8AC3E}">
-        <p14:creationId xmlns:p14="http://schemas.microsoft.com/office/powerpoint/2010/main" val="1824176123"/>
+        <p14:creationId xmlns:p14="http://schemas.microsoft.com/office/powerpoint/2010/main" val="147877769"/>
       </p:ext>
     </p:extLst>
   </p:cSld>

</xml_diff>